<commit_message>
Actualizo la version a la que usamos en la exposicion
</commit_message>
<xml_diff>
--- a/exposiciones/RodriguezZuriel-IbarraOmar/Inteligencia artificial en los sistemas operativos.pptx
+++ b/exposiciones/RodriguezZuriel-IbarraOmar/Inteligencia artificial en los sistemas operativos.pptx
@@ -31,20 +31,23 @@
     <p:sldId id="276" r:id="rId26"/>
     <p:sldId id="277" r:id="rId27"/>
     <p:sldId id="278" r:id="rId28"/>
+    <p:sldId id="279" r:id="rId29"/>
+    <p:sldId id="280" r:id="rId30"/>
+    <p:sldId id="281" r:id="rId31"/>
   </p:sldIdLst>
   <p:sldSz cy="5143500" cx="9144000"/>
   <p:notesSz cx="6858000" cy="9144000"/>
   <p:embeddedFontLst>
     <p:embeddedFont>
       <p:font typeface="Proxima Nova"/>
-      <p:regular r:id="rId29"/>
-      <p:bold r:id="rId30"/>
-      <p:italic r:id="rId31"/>
-      <p:boldItalic r:id="rId32"/>
+      <p:regular r:id="rId32"/>
+      <p:bold r:id="rId33"/>
+      <p:italic r:id="rId34"/>
+      <p:boldItalic r:id="rId35"/>
     </p:embeddedFont>
     <p:embeddedFont>
       <p:font typeface="Alfa Slab One"/>
-      <p:regular r:id="rId33"/>
+      <p:regular r:id="rId36"/>
     </p:embeddedFont>
   </p:embeddedFontLst>
   <p:defaultTextStyle>
@@ -823,7 +826,7 @@
   <p:cSld>
     <p:spTree>
       <p:nvGrpSpPr>
-        <p:cNvPr id="108" name="Shape 108"/>
+        <p:cNvPr id="109" name="Shape 109"/>
         <p:cNvGrpSpPr/>
         <p:nvPr/>
       </p:nvGrpSpPr>
@@ -837,7 +840,7 @@
       </p:grpSpPr>
       <p:sp>
         <p:nvSpPr>
-          <p:cNvPr id="109" name="Google Shape;109;g50fad55856_0_54:notes"/>
+          <p:cNvPr id="110" name="Google Shape;110;g50fad55856_0_54:notes"/>
           <p:cNvSpPr/>
           <p:nvPr>
             <p:ph idx="2" type="sldImg"/>
@@ -872,7 +875,7 @@
       </p:sp>
       <p:sp>
         <p:nvSpPr>
-          <p:cNvPr id="110" name="Google Shape;110;g50fad55856_0_54:notes"/>
+          <p:cNvPr id="111" name="Google Shape;111;g50fad55856_0_54:notes"/>
           <p:cNvSpPr txBox="1"/>
           <p:nvPr>
             <p:ph idx="1" type="body"/>
@@ -922,7 +925,7 @@
   <p:cSld>
     <p:spTree>
       <p:nvGrpSpPr>
-        <p:cNvPr id="114" name="Shape 114"/>
+        <p:cNvPr id="115" name="Shape 115"/>
         <p:cNvGrpSpPr/>
         <p:nvPr/>
       </p:nvGrpSpPr>
@@ -936,7 +939,7 @@
       </p:grpSpPr>
       <p:sp>
         <p:nvSpPr>
-          <p:cNvPr id="115" name="Google Shape;115;g50fad55856_0_64:notes"/>
+          <p:cNvPr id="116" name="Google Shape;116;g50fad55856_0_64:notes"/>
           <p:cNvSpPr/>
           <p:nvPr>
             <p:ph idx="2" type="sldImg"/>
@@ -971,7 +974,7 @@
       </p:sp>
       <p:sp>
         <p:nvSpPr>
-          <p:cNvPr id="116" name="Google Shape;116;g50fad55856_0_64:notes"/>
+          <p:cNvPr id="117" name="Google Shape;117;g50fad55856_0_64:notes"/>
           <p:cNvSpPr txBox="1"/>
           <p:nvPr>
             <p:ph idx="1" type="body"/>
@@ -1021,7 +1024,7 @@
   <p:cSld>
     <p:spTree>
       <p:nvGrpSpPr>
-        <p:cNvPr id="120" name="Shape 120"/>
+        <p:cNvPr id="122" name="Shape 122"/>
         <p:cNvGrpSpPr/>
         <p:nvPr/>
       </p:nvGrpSpPr>
@@ -1035,7 +1038,7 @@
       </p:grpSpPr>
       <p:sp>
         <p:nvSpPr>
-          <p:cNvPr id="121" name="Google Shape;121;g50fad55856_0_72:notes"/>
+          <p:cNvPr id="123" name="Google Shape;123;g50fad55856_0_72:notes"/>
           <p:cNvSpPr/>
           <p:nvPr>
             <p:ph idx="2" type="sldImg"/>
@@ -1070,7 +1073,7 @@
       </p:sp>
       <p:sp>
         <p:nvSpPr>
-          <p:cNvPr id="122" name="Google Shape;122;g50fad55856_0_72:notes"/>
+          <p:cNvPr id="124" name="Google Shape;124;g50fad55856_0_72:notes"/>
           <p:cNvSpPr txBox="1"/>
           <p:nvPr>
             <p:ph idx="1" type="body"/>
@@ -1120,7 +1123,7 @@
   <p:cSld>
     <p:spTree>
       <p:nvGrpSpPr>
-        <p:cNvPr id="127" name="Shape 127"/>
+        <p:cNvPr id="129" name="Shape 129"/>
         <p:cNvGrpSpPr/>
         <p:nvPr/>
       </p:nvGrpSpPr>
@@ -1134,7 +1137,7 @@
       </p:grpSpPr>
       <p:sp>
         <p:nvSpPr>
-          <p:cNvPr id="128" name="Google Shape;128;g50fad55856_0_11:notes"/>
+          <p:cNvPr id="130" name="Google Shape;130;g50fad55856_0_11:notes"/>
           <p:cNvSpPr/>
           <p:nvPr>
             <p:ph idx="2" type="sldImg"/>
@@ -1169,7 +1172,7 @@
       </p:sp>
       <p:sp>
         <p:nvSpPr>
-          <p:cNvPr id="129" name="Google Shape;129;g50fad55856_0_11:notes"/>
+          <p:cNvPr id="131" name="Google Shape;131;g50fad55856_0_11:notes"/>
           <p:cNvSpPr txBox="1"/>
           <p:nvPr>
             <p:ph idx="1" type="body"/>
@@ -1219,7 +1222,7 @@
   <p:cSld>
     <p:spTree>
       <p:nvGrpSpPr>
-        <p:cNvPr id="134" name="Shape 134"/>
+        <p:cNvPr id="136" name="Shape 136"/>
         <p:cNvGrpSpPr/>
         <p:nvPr/>
       </p:nvGrpSpPr>
@@ -1233,7 +1236,7 @@
       </p:grpSpPr>
       <p:sp>
         <p:nvSpPr>
-          <p:cNvPr id="135" name="Google Shape;135;g50fad55856_0_79:notes"/>
+          <p:cNvPr id="137" name="Google Shape;137;g50fad55856_0_79:notes"/>
           <p:cNvSpPr/>
           <p:nvPr>
             <p:ph idx="2" type="sldImg"/>
@@ -1268,7 +1271,7 @@
       </p:sp>
       <p:sp>
         <p:nvSpPr>
-          <p:cNvPr id="136" name="Google Shape;136;g50fad55856_0_79:notes"/>
+          <p:cNvPr id="138" name="Google Shape;138;g50fad55856_0_79:notes"/>
           <p:cNvSpPr txBox="1"/>
           <p:nvPr>
             <p:ph idx="1" type="body"/>
@@ -1318,7 +1321,7 @@
   <p:cSld>
     <p:spTree>
       <p:nvGrpSpPr>
-        <p:cNvPr id="140" name="Shape 140"/>
+        <p:cNvPr id="142" name="Shape 142"/>
         <p:cNvGrpSpPr/>
         <p:nvPr/>
       </p:nvGrpSpPr>
@@ -1332,7 +1335,7 @@
       </p:grpSpPr>
       <p:sp>
         <p:nvSpPr>
-          <p:cNvPr id="141" name="Google Shape;141;g50fad55856_0_86:notes"/>
+          <p:cNvPr id="143" name="Google Shape;143;g50fad55856_0_86:notes"/>
           <p:cNvSpPr/>
           <p:nvPr>
             <p:ph idx="2" type="sldImg"/>
@@ -1367,7 +1370,7 @@
       </p:sp>
       <p:sp>
         <p:nvSpPr>
-          <p:cNvPr id="142" name="Google Shape;142;g50fad55856_0_86:notes"/>
+          <p:cNvPr id="144" name="Google Shape;144;g50fad55856_0_86:notes"/>
           <p:cNvSpPr txBox="1"/>
           <p:nvPr>
             <p:ph idx="1" type="body"/>
@@ -1417,7 +1420,7 @@
   <p:cSld>
     <p:spTree>
       <p:nvGrpSpPr>
-        <p:cNvPr id="146" name="Shape 146"/>
+        <p:cNvPr id="148" name="Shape 148"/>
         <p:cNvGrpSpPr/>
         <p:nvPr/>
       </p:nvGrpSpPr>
@@ -1431,7 +1434,7 @@
       </p:grpSpPr>
       <p:sp>
         <p:nvSpPr>
-          <p:cNvPr id="147" name="Google Shape;147;g50fad55856_0_91:notes"/>
+          <p:cNvPr id="149" name="Google Shape;149;g50fad55856_0_91:notes"/>
           <p:cNvSpPr/>
           <p:nvPr>
             <p:ph idx="2" type="sldImg"/>
@@ -1466,7 +1469,7 @@
       </p:sp>
       <p:sp>
         <p:nvSpPr>
-          <p:cNvPr id="148" name="Google Shape;148;g50fad55856_0_91:notes"/>
+          <p:cNvPr id="150" name="Google Shape;150;g50fad55856_0_91:notes"/>
           <p:cNvSpPr txBox="1"/>
           <p:nvPr>
             <p:ph idx="1" type="body"/>
@@ -1516,7 +1519,7 @@
   <p:cSld>
     <p:spTree>
       <p:nvGrpSpPr>
-        <p:cNvPr id="152" name="Shape 152"/>
+        <p:cNvPr id="154" name="Shape 154"/>
         <p:cNvGrpSpPr/>
         <p:nvPr/>
       </p:nvGrpSpPr>
@@ -1530,7 +1533,7 @@
       </p:grpSpPr>
       <p:sp>
         <p:nvSpPr>
-          <p:cNvPr id="153" name="Google Shape;153;g50fad55856_0_96:notes"/>
+          <p:cNvPr id="155" name="Google Shape;155;g50fad55856_0_96:notes"/>
           <p:cNvSpPr/>
           <p:nvPr>
             <p:ph idx="2" type="sldImg"/>
@@ -1565,7 +1568,7 @@
       </p:sp>
       <p:sp>
         <p:nvSpPr>
-          <p:cNvPr id="154" name="Google Shape;154;g50fad55856_0_96:notes"/>
+          <p:cNvPr id="156" name="Google Shape;156;g50fad55856_0_96:notes"/>
           <p:cNvSpPr txBox="1"/>
           <p:nvPr>
             <p:ph idx="1" type="body"/>
@@ -1615,7 +1618,7 @@
   <p:cSld>
     <p:spTree>
       <p:nvGrpSpPr>
-        <p:cNvPr id="157" name="Shape 157"/>
+        <p:cNvPr id="160" name="Shape 160"/>
         <p:cNvGrpSpPr/>
         <p:nvPr/>
       </p:nvGrpSpPr>
@@ -1629,7 +1632,7 @@
       </p:grpSpPr>
       <p:sp>
         <p:nvSpPr>
-          <p:cNvPr id="158" name="Google Shape;158;g50fad55856_0_101:notes"/>
+          <p:cNvPr id="161" name="Google Shape;161;g50fad55856_0_101:notes"/>
           <p:cNvSpPr/>
           <p:nvPr>
             <p:ph idx="2" type="sldImg"/>
@@ -1664,7 +1667,7 @@
       </p:sp>
       <p:sp>
         <p:nvSpPr>
-          <p:cNvPr id="159" name="Google Shape;159;g50fad55856_0_101:notes"/>
+          <p:cNvPr id="162" name="Google Shape;162;g50fad55856_0_101:notes"/>
           <p:cNvSpPr txBox="1"/>
           <p:nvPr>
             <p:ph idx="1" type="body"/>
@@ -1714,7 +1717,7 @@
   <p:cSld>
     <p:spTree>
       <p:nvGrpSpPr>
-        <p:cNvPr id="162" name="Shape 162"/>
+        <p:cNvPr id="166" name="Shape 166"/>
         <p:cNvGrpSpPr/>
         <p:nvPr/>
       </p:nvGrpSpPr>
@@ -1728,7 +1731,7 @@
       </p:grpSpPr>
       <p:sp>
         <p:nvSpPr>
-          <p:cNvPr id="163" name="Google Shape;163;g50fad55856_0_106:notes"/>
+          <p:cNvPr id="167" name="Google Shape;167;g50fad55856_0_106:notes"/>
           <p:cNvSpPr/>
           <p:nvPr>
             <p:ph idx="2" type="sldImg"/>
@@ -1763,7 +1766,7 @@
       </p:sp>
       <p:sp>
         <p:nvSpPr>
-          <p:cNvPr id="164" name="Google Shape;164;g50fad55856_0_106:notes"/>
+          <p:cNvPr id="168" name="Google Shape;168;g50fad55856_0_106:notes"/>
           <p:cNvSpPr txBox="1"/>
           <p:nvPr>
             <p:ph idx="1" type="body"/>
@@ -1912,7 +1915,7 @@
   <p:cSld>
     <p:spTree>
       <p:nvGrpSpPr>
-        <p:cNvPr id="167" name="Shape 167"/>
+        <p:cNvPr id="172" name="Shape 172"/>
         <p:cNvGrpSpPr/>
         <p:nvPr/>
       </p:nvGrpSpPr>
@@ -1926,7 +1929,7 @@
       </p:grpSpPr>
       <p:sp>
         <p:nvSpPr>
-          <p:cNvPr id="168" name="Google Shape;168;g50fc354232_0_5:notes"/>
+          <p:cNvPr id="173" name="Google Shape;173;g50fc354232_0_5:notes"/>
           <p:cNvSpPr/>
           <p:nvPr>
             <p:ph idx="2" type="sldImg"/>
@@ -1961,7 +1964,7 @@
       </p:sp>
       <p:sp>
         <p:nvSpPr>
-          <p:cNvPr id="169" name="Google Shape;169;g50fc354232_0_5:notes"/>
+          <p:cNvPr id="174" name="Google Shape;174;g50fc354232_0_5:notes"/>
           <p:cNvSpPr txBox="1"/>
           <p:nvPr>
             <p:ph idx="1" type="body"/>
@@ -2011,7 +2014,7 @@
   <p:cSld>
     <p:spTree>
       <p:nvGrpSpPr>
-        <p:cNvPr id="173" name="Shape 173"/>
+        <p:cNvPr id="178" name="Shape 178"/>
         <p:cNvGrpSpPr/>
         <p:nvPr/>
       </p:nvGrpSpPr>
@@ -2025,7 +2028,7 @@
       </p:grpSpPr>
       <p:sp>
         <p:nvSpPr>
-          <p:cNvPr id="174" name="Google Shape;174;g50fc354232_0_10:notes"/>
+          <p:cNvPr id="179" name="Google Shape;179;g50fc354232_0_10:notes"/>
           <p:cNvSpPr/>
           <p:nvPr>
             <p:ph idx="2" type="sldImg"/>
@@ -2060,7 +2063,7 @@
       </p:sp>
       <p:sp>
         <p:nvSpPr>
-          <p:cNvPr id="175" name="Google Shape;175;g50fc354232_0_10:notes"/>
+          <p:cNvPr id="180" name="Google Shape;180;g50fc354232_0_10:notes"/>
           <p:cNvSpPr txBox="1"/>
           <p:nvPr>
             <p:ph idx="1" type="body"/>
@@ -2110,7 +2113,7 @@
   <p:cSld>
     <p:spTree>
       <p:nvGrpSpPr>
-        <p:cNvPr id="178" name="Shape 178"/>
+        <p:cNvPr id="183" name="Shape 183"/>
         <p:cNvGrpSpPr/>
         <p:nvPr/>
       </p:nvGrpSpPr>
@@ -2124,7 +2127,7 @@
       </p:grpSpPr>
       <p:sp>
         <p:nvSpPr>
-          <p:cNvPr id="179" name="Google Shape;179;g50fad55856_0_6:notes"/>
+          <p:cNvPr id="184" name="Google Shape;184;g50fc354232_0_16:notes"/>
           <p:cNvSpPr/>
           <p:nvPr>
             <p:ph idx="2" type="sldImg"/>
@@ -2159,7 +2162,7 @@
       </p:sp>
       <p:sp>
         <p:nvSpPr>
-          <p:cNvPr id="180" name="Google Shape;180;g50fad55856_0_6:notes"/>
+          <p:cNvPr id="185" name="Google Shape;185;g50fc354232_0_16:notes"/>
           <p:cNvSpPr txBox="1"/>
           <p:nvPr>
             <p:ph idx="1" type="body"/>
@@ -2209,7 +2212,7 @@
   <p:cSld>
     <p:spTree>
       <p:nvGrpSpPr>
-        <p:cNvPr id="184" name="Shape 184"/>
+        <p:cNvPr id="190" name="Shape 190"/>
         <p:cNvGrpSpPr/>
         <p:nvPr/>
       </p:nvGrpSpPr>
@@ -2223,7 +2226,7 @@
       </p:grpSpPr>
       <p:sp>
         <p:nvSpPr>
-          <p:cNvPr id="185" name="Google Shape;185;g522a83305d_0_0:notes"/>
+          <p:cNvPr id="191" name="Google Shape;191;g50fc354232_0_26:notes"/>
           <p:cNvSpPr/>
           <p:nvPr>
             <p:ph idx="2" type="sldImg"/>
@@ -2258,7 +2261,304 @@
       </p:sp>
       <p:sp>
         <p:nvSpPr>
-          <p:cNvPr id="186" name="Google Shape;186;g522a83305d_0_0:notes"/>
+          <p:cNvPr id="192" name="Google Shape;192;g50fc354232_0_26:notes"/>
+          <p:cNvSpPr txBox="1"/>
+          <p:nvPr>
+            <p:ph idx="1" type="body"/>
+          </p:nvPr>
+        </p:nvSpPr>
+        <p:spPr>
+          <a:xfrm>
+            <a:off x="685800" y="4343400"/>
+            <a:ext cx="5486400" cy="4114800"/>
+          </a:xfrm>
+          <a:prstGeom prst="rect">
+            <a:avLst/>
+          </a:prstGeom>
+        </p:spPr>
+        <p:txBody>
+          <a:bodyPr anchorCtr="0" anchor="t" bIns="91425" lIns="91425" spcFirstLastPara="1" rIns="91425" wrap="square" tIns="91425">
+            <a:noAutofit/>
+          </a:bodyPr>
+          <a:lstStyle/>
+          <a:p>
+            <a:pPr indent="0" lvl="0" marL="0" rtl="0" algn="l">
+              <a:spcBef>
+                <a:spcPts val="0"/>
+              </a:spcBef>
+              <a:spcAft>
+                <a:spcPts val="0"/>
+              </a:spcAft>
+              <a:buNone/>
+            </a:pPr>
+            <a:r>
+              <a:t/>
+            </a:r>
+            <a:endParaRPr/>
+          </a:p>
+        </p:txBody>
+      </p:sp>
+    </p:spTree>
+  </p:cSld>
+  <p:clrMapOvr>
+    <a:masterClrMapping/>
+  </p:clrMapOvr>
+</p:notes>
+</file>
+
+<file path=ppt/notesSlides/notesSlide24.xml><?xml version="1.0" encoding="utf-8"?>
+<p:notes xmlns:a="http://schemas.openxmlformats.org/drawingml/2006/main" xmlns:r="http://schemas.openxmlformats.org/officeDocument/2006/relationships" xmlns:mc="http://schemas.openxmlformats.org/markup-compatibility/2006" xmlns:mv="urn:schemas-microsoft-com:mac:vml" xmlns:p="http://schemas.openxmlformats.org/presentationml/2006/main" xmlns:c="http://schemas.openxmlformats.org/drawingml/2006/chart" xmlns:dgm="http://schemas.openxmlformats.org/drawingml/2006/diagram" xmlns:o="urn:schemas-microsoft-com:office:office" xmlns:v="urn:schemas-microsoft-com:vml" xmlns:pvml="urn:schemas-microsoft-com:office:powerpoint" xmlns:com="http://schemas.openxmlformats.org/drawingml/2006/compatibility" xmlns:p14="http://schemas.microsoft.com/office/powerpoint/2010/main" xmlns:p15="http://schemas.microsoft.com/office/powerpoint/2012/main" showMasterPhAnim="0" showMasterSp="0">
+  <p:cSld>
+    <p:spTree>
+      <p:nvGrpSpPr>
+        <p:cNvPr id="196" name="Shape 196"/>
+        <p:cNvGrpSpPr/>
+        <p:nvPr/>
+      </p:nvGrpSpPr>
+      <p:grpSpPr>
+        <a:xfrm>
+          <a:off x="0" y="0"/>
+          <a:ext cx="0" cy="0"/>
+          <a:chOff x="0" y="0"/>
+          <a:chExt cx="0" cy="0"/>
+        </a:xfrm>
+      </p:grpSpPr>
+      <p:sp>
+        <p:nvSpPr>
+          <p:cNvPr id="197" name="Google Shape;197;g50fc354232_0_21:notes"/>
+          <p:cNvSpPr/>
+          <p:nvPr>
+            <p:ph idx="2" type="sldImg"/>
+          </p:nvPr>
+        </p:nvSpPr>
+        <p:spPr>
+          <a:xfrm>
+            <a:off x="381300" y="685800"/>
+            <a:ext cx="6096000" cy="3429000"/>
+          </a:xfrm>
+          <a:custGeom>
+            <a:rect b="b" l="l" r="r" t="t"/>
+            <a:pathLst>
+              <a:path extrusionOk="0" h="120000" w="120000">
+                <a:moveTo>
+                  <a:pt x="0" y="0"/>
+                </a:moveTo>
+                <a:lnTo>
+                  <a:pt x="120000" y="0"/>
+                </a:lnTo>
+                <a:lnTo>
+                  <a:pt x="120000" y="120000"/>
+                </a:lnTo>
+                <a:lnTo>
+                  <a:pt x="0" y="120000"/>
+                </a:lnTo>
+                <a:close/>
+              </a:path>
+            </a:pathLst>
+          </a:custGeom>
+        </p:spPr>
+      </p:sp>
+      <p:sp>
+        <p:nvSpPr>
+          <p:cNvPr id="198" name="Google Shape;198;g50fc354232_0_21:notes"/>
+          <p:cNvSpPr txBox="1"/>
+          <p:nvPr>
+            <p:ph idx="1" type="body"/>
+          </p:nvPr>
+        </p:nvSpPr>
+        <p:spPr>
+          <a:xfrm>
+            <a:off x="685800" y="4343400"/>
+            <a:ext cx="5486400" cy="4114800"/>
+          </a:xfrm>
+          <a:prstGeom prst="rect">
+            <a:avLst/>
+          </a:prstGeom>
+        </p:spPr>
+        <p:txBody>
+          <a:bodyPr anchorCtr="0" anchor="t" bIns="91425" lIns="91425" spcFirstLastPara="1" rIns="91425" wrap="square" tIns="91425">
+            <a:noAutofit/>
+          </a:bodyPr>
+          <a:lstStyle/>
+          <a:p>
+            <a:pPr indent="0" lvl="0" marL="0" rtl="0" algn="l">
+              <a:spcBef>
+                <a:spcPts val="0"/>
+              </a:spcBef>
+              <a:spcAft>
+                <a:spcPts val="0"/>
+              </a:spcAft>
+              <a:buNone/>
+            </a:pPr>
+            <a:r>
+              <a:t/>
+            </a:r>
+            <a:endParaRPr/>
+          </a:p>
+        </p:txBody>
+      </p:sp>
+    </p:spTree>
+  </p:cSld>
+  <p:clrMapOvr>
+    <a:masterClrMapping/>
+  </p:clrMapOvr>
+</p:notes>
+</file>
+
+<file path=ppt/notesSlides/notesSlide25.xml><?xml version="1.0" encoding="utf-8"?>
+<p:notes xmlns:a="http://schemas.openxmlformats.org/drawingml/2006/main" xmlns:r="http://schemas.openxmlformats.org/officeDocument/2006/relationships" xmlns:mc="http://schemas.openxmlformats.org/markup-compatibility/2006" xmlns:mv="urn:schemas-microsoft-com:mac:vml" xmlns:p="http://schemas.openxmlformats.org/presentationml/2006/main" xmlns:c="http://schemas.openxmlformats.org/drawingml/2006/chart" xmlns:dgm="http://schemas.openxmlformats.org/drawingml/2006/diagram" xmlns:o="urn:schemas-microsoft-com:office:office" xmlns:v="urn:schemas-microsoft-com:vml" xmlns:pvml="urn:schemas-microsoft-com:office:powerpoint" xmlns:com="http://schemas.openxmlformats.org/drawingml/2006/compatibility" xmlns:p14="http://schemas.microsoft.com/office/powerpoint/2010/main" xmlns:p15="http://schemas.microsoft.com/office/powerpoint/2012/main" showMasterPhAnim="0" showMasterSp="0">
+  <p:cSld>
+    <p:spTree>
+      <p:nvGrpSpPr>
+        <p:cNvPr id="201" name="Shape 201"/>
+        <p:cNvGrpSpPr/>
+        <p:nvPr/>
+      </p:nvGrpSpPr>
+      <p:grpSpPr>
+        <a:xfrm>
+          <a:off x="0" y="0"/>
+          <a:ext cx="0" cy="0"/>
+          <a:chOff x="0" y="0"/>
+          <a:chExt cx="0" cy="0"/>
+        </a:xfrm>
+      </p:grpSpPr>
+      <p:sp>
+        <p:nvSpPr>
+          <p:cNvPr id="202" name="Google Shape;202;g50fad55856_0_6:notes"/>
+          <p:cNvSpPr/>
+          <p:nvPr>
+            <p:ph idx="2" type="sldImg"/>
+          </p:nvPr>
+        </p:nvSpPr>
+        <p:spPr>
+          <a:xfrm>
+            <a:off x="381300" y="685800"/>
+            <a:ext cx="6096000" cy="3429000"/>
+          </a:xfrm>
+          <a:custGeom>
+            <a:rect b="b" l="l" r="r" t="t"/>
+            <a:pathLst>
+              <a:path extrusionOk="0" h="120000" w="120000">
+                <a:moveTo>
+                  <a:pt x="0" y="0"/>
+                </a:moveTo>
+                <a:lnTo>
+                  <a:pt x="120000" y="0"/>
+                </a:lnTo>
+                <a:lnTo>
+                  <a:pt x="120000" y="120000"/>
+                </a:lnTo>
+                <a:lnTo>
+                  <a:pt x="0" y="120000"/>
+                </a:lnTo>
+                <a:close/>
+              </a:path>
+            </a:pathLst>
+          </a:custGeom>
+        </p:spPr>
+      </p:sp>
+      <p:sp>
+        <p:nvSpPr>
+          <p:cNvPr id="203" name="Google Shape;203;g50fad55856_0_6:notes"/>
+          <p:cNvSpPr txBox="1"/>
+          <p:nvPr>
+            <p:ph idx="1" type="body"/>
+          </p:nvPr>
+        </p:nvSpPr>
+        <p:spPr>
+          <a:xfrm>
+            <a:off x="685800" y="4343400"/>
+            <a:ext cx="5486400" cy="4114800"/>
+          </a:xfrm>
+          <a:prstGeom prst="rect">
+            <a:avLst/>
+          </a:prstGeom>
+        </p:spPr>
+        <p:txBody>
+          <a:bodyPr anchorCtr="0" anchor="t" bIns="91425" lIns="91425" spcFirstLastPara="1" rIns="91425" wrap="square" tIns="91425">
+            <a:noAutofit/>
+          </a:bodyPr>
+          <a:lstStyle/>
+          <a:p>
+            <a:pPr indent="0" lvl="0" marL="0" rtl="0" algn="l">
+              <a:spcBef>
+                <a:spcPts val="0"/>
+              </a:spcBef>
+              <a:spcAft>
+                <a:spcPts val="0"/>
+              </a:spcAft>
+              <a:buNone/>
+            </a:pPr>
+            <a:r>
+              <a:t/>
+            </a:r>
+            <a:endParaRPr/>
+          </a:p>
+        </p:txBody>
+      </p:sp>
+    </p:spTree>
+  </p:cSld>
+  <p:clrMapOvr>
+    <a:masterClrMapping/>
+  </p:clrMapOvr>
+</p:notes>
+</file>
+
+<file path=ppt/notesSlides/notesSlide26.xml><?xml version="1.0" encoding="utf-8"?>
+<p:notes xmlns:a="http://schemas.openxmlformats.org/drawingml/2006/main" xmlns:r="http://schemas.openxmlformats.org/officeDocument/2006/relationships" xmlns:mc="http://schemas.openxmlformats.org/markup-compatibility/2006" xmlns:mv="urn:schemas-microsoft-com:mac:vml" xmlns:p="http://schemas.openxmlformats.org/presentationml/2006/main" xmlns:c="http://schemas.openxmlformats.org/drawingml/2006/chart" xmlns:dgm="http://schemas.openxmlformats.org/drawingml/2006/diagram" xmlns:o="urn:schemas-microsoft-com:office:office" xmlns:v="urn:schemas-microsoft-com:vml" xmlns:pvml="urn:schemas-microsoft-com:office:powerpoint" xmlns:com="http://schemas.openxmlformats.org/drawingml/2006/compatibility" xmlns:p14="http://schemas.microsoft.com/office/powerpoint/2010/main" xmlns:p15="http://schemas.microsoft.com/office/powerpoint/2012/main" showMasterPhAnim="0" showMasterSp="0">
+  <p:cSld>
+    <p:spTree>
+      <p:nvGrpSpPr>
+        <p:cNvPr id="207" name="Shape 207"/>
+        <p:cNvGrpSpPr/>
+        <p:nvPr/>
+      </p:nvGrpSpPr>
+      <p:grpSpPr>
+        <a:xfrm>
+          <a:off x="0" y="0"/>
+          <a:ext cx="0" cy="0"/>
+          <a:chOff x="0" y="0"/>
+          <a:chExt cx="0" cy="0"/>
+        </a:xfrm>
+      </p:grpSpPr>
+      <p:sp>
+        <p:nvSpPr>
+          <p:cNvPr id="208" name="Google Shape;208;g522a83305d_0_0:notes"/>
+          <p:cNvSpPr/>
+          <p:nvPr>
+            <p:ph idx="2" type="sldImg"/>
+          </p:nvPr>
+        </p:nvSpPr>
+        <p:spPr>
+          <a:xfrm>
+            <a:off x="381300" y="685800"/>
+            <a:ext cx="6096000" cy="3429000"/>
+          </a:xfrm>
+          <a:custGeom>
+            <a:rect b="b" l="l" r="r" t="t"/>
+            <a:pathLst>
+              <a:path extrusionOk="0" h="120000" w="120000">
+                <a:moveTo>
+                  <a:pt x="0" y="0"/>
+                </a:moveTo>
+                <a:lnTo>
+                  <a:pt x="120000" y="0"/>
+                </a:lnTo>
+                <a:lnTo>
+                  <a:pt x="120000" y="120000"/>
+                </a:lnTo>
+                <a:lnTo>
+                  <a:pt x="0" y="120000"/>
+                </a:lnTo>
+                <a:close/>
+              </a:path>
+            </a:pathLst>
+          </a:custGeom>
+        </p:spPr>
+      </p:sp>
+      <p:sp>
+        <p:nvSpPr>
+          <p:cNvPr id="209" name="Google Shape;209;g522a83305d_0_0:notes"/>
           <p:cNvSpPr txBox="1"/>
           <p:nvPr>
             <p:ph idx="1" type="body"/>
@@ -8323,7 +8623,7 @@
   <p:cSld>
     <p:spTree>
       <p:nvGrpSpPr>
-        <p:cNvPr id="111" name="Shape 111"/>
+        <p:cNvPr id="112" name="Shape 112"/>
         <p:cNvGrpSpPr/>
         <p:nvPr/>
       </p:nvGrpSpPr>
@@ -8337,7 +8637,7 @@
       </p:grpSpPr>
       <p:sp>
         <p:nvSpPr>
-          <p:cNvPr id="112" name="Google Shape;112;p22"/>
+          <p:cNvPr id="113" name="Google Shape;113;p22"/>
           <p:cNvSpPr txBox="1"/>
           <p:nvPr>
             <p:ph type="title"/>
@@ -8377,7 +8677,7 @@
       </p:sp>
       <p:sp>
         <p:nvSpPr>
-          <p:cNvPr id="113" name="Google Shape;113;p22"/>
+          <p:cNvPr id="114" name="Google Shape;114;p22"/>
           <p:cNvSpPr txBox="1"/>
           <p:nvPr>
             <p:ph idx="1" type="body"/>
@@ -8431,7 +8731,7 @@
   <p:cSld>
     <p:spTree>
       <p:nvGrpSpPr>
-        <p:cNvPr id="117" name="Shape 117"/>
+        <p:cNvPr id="118" name="Shape 118"/>
         <p:cNvGrpSpPr/>
         <p:nvPr/>
       </p:nvGrpSpPr>
@@ -8445,7 +8745,7 @@
       </p:grpSpPr>
       <p:sp>
         <p:nvSpPr>
-          <p:cNvPr id="118" name="Google Shape;118;p23"/>
+          <p:cNvPr id="119" name="Google Shape;119;p23"/>
           <p:cNvSpPr txBox="1"/>
           <p:nvPr>
             <p:ph type="title"/>
@@ -8453,7 +8753,7 @@
         </p:nvSpPr>
         <p:spPr>
           <a:xfrm>
-            <a:off x="311700" y="445025"/>
+            <a:off x="311700" y="220550"/>
             <a:ext cx="8520600" cy="572700"/>
           </a:xfrm>
           <a:prstGeom prst="rect">
@@ -8485,7 +8785,7 @@
       </p:sp>
       <p:sp>
         <p:nvSpPr>
-          <p:cNvPr id="119" name="Google Shape;119;p23"/>
+          <p:cNvPr id="120" name="Google Shape;120;p23"/>
           <p:cNvSpPr txBox="1"/>
           <p:nvPr>
             <p:ph idx="1" type="body"/>
@@ -8493,7 +8793,7 @@
         </p:nvSpPr>
         <p:spPr>
           <a:xfrm>
-            <a:off x="311700" y="1152475"/>
+            <a:off x="311700" y="847675"/>
             <a:ext cx="8520600" cy="3416400"/>
           </a:xfrm>
           <a:prstGeom prst="rect">
@@ -8519,21 +8819,6 @@
               <a:rPr lang="en" sz="2400"/>
               <a:t>A grandes rasgos, entendemos inteligencia como la capacidad de percibir el entorno, procesar la información que se obtiene a partir de él, y reaccionar en consecuencia.</a:t>
             </a:r>
-            <a:endParaRPr sz="2400"/>
-          </a:p>
-          <a:p>
-            <a:pPr indent="0" lvl="0" marL="0" rtl="0" algn="ctr">
-              <a:spcBef>
-                <a:spcPts val="1600"/>
-              </a:spcBef>
-              <a:spcAft>
-                <a:spcPts val="0"/>
-              </a:spcAft>
-              <a:buNone/>
-            </a:pPr>
-            <a:r>
-              <a:t/>
-            </a:r>
             <a:endParaRPr b="1" sz="2400"/>
           </a:p>
           <a:p>
@@ -8554,6 +8839,34 @@
           </a:p>
         </p:txBody>
       </p:sp>
+      <p:pic>
+        <p:nvPicPr>
+          <p:cNvPr id="121" name="Google Shape;121;p23"/>
+          <p:cNvPicPr preferRelativeResize="0"/>
+          <p:nvPr/>
+        </p:nvPicPr>
+        <p:blipFill>
+          <a:blip r:embed="rId3">
+            <a:alphaModFix/>
+          </a:blip>
+          <a:stretch>
+            <a:fillRect/>
+          </a:stretch>
+        </p:blipFill>
+        <p:spPr>
+          <a:xfrm>
+            <a:off x="2953650" y="2838169"/>
+            <a:ext cx="3156076" cy="2065375"/>
+          </a:xfrm>
+          <a:prstGeom prst="rect">
+            <a:avLst/>
+          </a:prstGeom>
+          <a:noFill/>
+          <a:ln>
+            <a:noFill/>
+          </a:ln>
+        </p:spPr>
+      </p:pic>
     </p:spTree>
   </p:cSld>
   <p:clrMapOvr>
@@ -8567,7 +8880,7 @@
   <p:cSld>
     <p:spTree>
       <p:nvGrpSpPr>
-        <p:cNvPr id="123" name="Shape 123"/>
+        <p:cNvPr id="125" name="Shape 125"/>
         <p:cNvGrpSpPr/>
         <p:nvPr/>
       </p:nvGrpSpPr>
@@ -8581,7 +8894,7 @@
       </p:grpSpPr>
       <p:sp>
         <p:nvSpPr>
-          <p:cNvPr id="124" name="Google Shape;124;p24"/>
+          <p:cNvPr id="126" name="Google Shape;126;p24"/>
           <p:cNvSpPr txBox="1"/>
           <p:nvPr>
             <p:ph type="title"/>
@@ -8621,7 +8934,7 @@
       </p:sp>
       <p:sp>
         <p:nvSpPr>
-          <p:cNvPr id="125" name="Google Shape;125;p24"/>
+          <p:cNvPr id="127" name="Google Shape;127;p24"/>
           <p:cNvSpPr txBox="1"/>
           <p:nvPr>
             <p:ph idx="1" type="body"/>
@@ -8677,7 +8990,7 @@
       </p:sp>
       <p:pic>
         <p:nvPicPr>
-          <p:cNvPr id="126" name="Google Shape;126;p24"/>
+          <p:cNvPr id="128" name="Google Shape;128;p24"/>
           <p:cNvPicPr preferRelativeResize="0"/>
           <p:nvPr/>
         </p:nvPicPr>
@@ -8716,7 +9029,7 @@
   <p:cSld>
     <p:spTree>
       <p:nvGrpSpPr>
-        <p:cNvPr id="130" name="Shape 130"/>
+        <p:cNvPr id="132" name="Shape 132"/>
         <p:cNvGrpSpPr/>
         <p:nvPr/>
       </p:nvGrpSpPr>
@@ -8730,7 +9043,7 @@
       </p:grpSpPr>
       <p:pic>
         <p:nvPicPr>
-          <p:cNvPr id="131" name="Google Shape;131;p25"/>
+          <p:cNvPr id="133" name="Google Shape;133;p25"/>
           <p:cNvPicPr preferRelativeResize="0"/>
           <p:nvPr/>
         </p:nvPicPr>
@@ -8758,7 +9071,7 @@
       </p:pic>
       <p:pic>
         <p:nvPicPr>
-          <p:cNvPr id="132" name="Google Shape;132;p25"/>
+          <p:cNvPr id="134" name="Google Shape;134;p25"/>
           <p:cNvPicPr preferRelativeResize="0"/>
           <p:nvPr/>
         </p:nvPicPr>
@@ -8786,7 +9099,7 @@
       </p:pic>
       <p:pic>
         <p:nvPicPr>
-          <p:cNvPr id="133" name="Google Shape;133;p25"/>
+          <p:cNvPr id="135" name="Google Shape;135;p25"/>
           <p:cNvPicPr preferRelativeResize="0"/>
           <p:nvPr/>
         </p:nvPicPr>
@@ -8825,7 +9138,7 @@
   <p:cSld>
     <p:spTree>
       <p:nvGrpSpPr>
-        <p:cNvPr id="137" name="Shape 137"/>
+        <p:cNvPr id="139" name="Shape 139"/>
         <p:cNvGrpSpPr/>
         <p:nvPr/>
       </p:nvGrpSpPr>
@@ -8839,7 +9152,7 @@
       </p:grpSpPr>
       <p:sp>
         <p:nvSpPr>
-          <p:cNvPr id="138" name="Google Shape;138;p26"/>
+          <p:cNvPr id="140" name="Google Shape;140;p26"/>
           <p:cNvSpPr txBox="1"/>
           <p:nvPr>
             <p:ph type="title"/>
@@ -8879,7 +9192,7 @@
       </p:sp>
       <p:sp>
         <p:nvSpPr>
-          <p:cNvPr id="139" name="Google Shape;139;p26"/>
+          <p:cNvPr id="141" name="Google Shape;141;p26"/>
           <p:cNvSpPr txBox="1"/>
           <p:nvPr>
             <p:ph idx="1" type="body"/>
@@ -8954,7 +9267,7 @@
   <p:cSld>
     <p:spTree>
       <p:nvGrpSpPr>
-        <p:cNvPr id="143" name="Shape 143"/>
+        <p:cNvPr id="145" name="Shape 145"/>
         <p:cNvGrpSpPr/>
         <p:nvPr/>
       </p:nvGrpSpPr>
@@ -8968,7 +9281,7 @@
       </p:grpSpPr>
       <p:sp>
         <p:nvSpPr>
-          <p:cNvPr id="144" name="Google Shape;144;p27"/>
+          <p:cNvPr id="146" name="Google Shape;146;p27"/>
           <p:cNvSpPr txBox="1"/>
           <p:nvPr>
             <p:ph type="title"/>
@@ -9008,7 +9321,7 @@
       </p:sp>
       <p:sp>
         <p:nvSpPr>
-          <p:cNvPr id="145" name="Google Shape;145;p27"/>
+          <p:cNvPr id="147" name="Google Shape;147;p27"/>
           <p:cNvSpPr txBox="1"/>
           <p:nvPr>
             <p:ph idx="1" type="body"/>
@@ -9059,7 +9372,7 @@
   <p:cSld>
     <p:spTree>
       <p:nvGrpSpPr>
-        <p:cNvPr id="149" name="Shape 149"/>
+        <p:cNvPr id="151" name="Shape 151"/>
         <p:cNvGrpSpPr/>
         <p:nvPr/>
       </p:nvGrpSpPr>
@@ -9073,7 +9386,7 @@
       </p:grpSpPr>
       <p:sp>
         <p:nvSpPr>
-          <p:cNvPr id="150" name="Google Shape;150;p28"/>
+          <p:cNvPr id="152" name="Google Shape;152;p28"/>
           <p:cNvSpPr txBox="1"/>
           <p:nvPr>
             <p:ph type="title"/>
@@ -9113,7 +9426,7 @@
       </p:sp>
       <p:sp>
         <p:nvSpPr>
-          <p:cNvPr id="151" name="Google Shape;151;p28"/>
+          <p:cNvPr id="153" name="Google Shape;153;p28"/>
           <p:cNvSpPr txBox="1"/>
           <p:nvPr>
             <p:ph idx="1" type="body"/>
@@ -9144,10 +9457,26 @@
               <a:buNone/>
             </a:pPr>
             <a:r>
-              <a:rPr lang="en"/>
+              <a:rPr lang="en">
+                <a:solidFill>
+                  <a:schemeClr val="accent6"/>
+                </a:solidFill>
+                <a:latin typeface="Alfa Slab One"/>
+                <a:ea typeface="Alfa Slab One"/>
+                <a:cs typeface="Alfa Slab One"/>
+                <a:sym typeface="Alfa Slab One"/>
+              </a:rPr>
               <a:t>1.	Adecuación al usuario</a:t>
             </a:r>
-            <a:endParaRPr/>
+            <a:endParaRPr>
+              <a:solidFill>
+                <a:schemeClr val="accent6"/>
+              </a:solidFill>
+              <a:latin typeface="Alfa Slab One"/>
+              <a:ea typeface="Alfa Slab One"/>
+              <a:cs typeface="Alfa Slab One"/>
+              <a:sym typeface="Alfa Slab One"/>
+            </a:endParaRPr>
           </a:p>
           <a:p>
             <a:pPr indent="0" lvl="0" marL="0" rtl="0" algn="l">
@@ -9195,7 +9524,7 @@
   <p:cSld>
     <p:spTree>
       <p:nvGrpSpPr>
-        <p:cNvPr id="155" name="Shape 155"/>
+        <p:cNvPr id="157" name="Shape 157"/>
         <p:cNvGrpSpPr/>
         <p:nvPr/>
       </p:nvGrpSpPr>
@@ -9209,7 +9538,7 @@
       </p:grpSpPr>
       <p:sp>
         <p:nvSpPr>
-          <p:cNvPr id="156" name="Google Shape;156;p29"/>
+          <p:cNvPr id="158" name="Google Shape;158;p29"/>
           <p:cNvSpPr txBox="1"/>
           <p:nvPr>
             <p:ph idx="1" type="body"/>
@@ -9240,8 +9569,40 @@
               <a:buNone/>
             </a:pPr>
             <a:r>
+              <a:rPr lang="en">
+                <a:solidFill>
+                  <a:schemeClr val="accent6"/>
+                </a:solidFill>
+                <a:latin typeface="Alfa Slab One"/>
+                <a:ea typeface="Alfa Slab One"/>
+                <a:cs typeface="Alfa Slab One"/>
+                <a:sym typeface="Alfa Slab One"/>
+              </a:rPr>
+              <a:t>2. Actualizarse automáticamente</a:t>
+            </a:r>
+            <a:endParaRPr>
+              <a:solidFill>
+                <a:schemeClr val="accent6"/>
+              </a:solidFill>
+              <a:latin typeface="Alfa Slab One"/>
+              <a:ea typeface="Alfa Slab One"/>
+              <a:cs typeface="Alfa Slab One"/>
+              <a:sym typeface="Alfa Slab One"/>
+            </a:endParaRPr>
+          </a:p>
+          <a:p>
+            <a:pPr indent="0" lvl="0" marL="0" rtl="0" algn="l">
+              <a:spcBef>
+                <a:spcPts val="1600"/>
+              </a:spcBef>
+              <a:spcAft>
+                <a:spcPts val="0"/>
+              </a:spcAft>
+              <a:buNone/>
+            </a:pPr>
+            <a:r>
               <a:rPr lang="en"/>
-              <a:t>2. Actualizarse automáticamente</a:t>
+              <a:t>Derivado del punto anterior, un AiOS debería ser capaz de realizar actualizaciones cuando lo considerase conveniente, sin comprometer el trabajo que se está ejecutando por el usuario</a:t>
             </a:r>
             <a:endParaRPr/>
           </a:p>
@@ -9251,22 +9612,6 @@
                 <a:spcPts val="1600"/>
               </a:spcBef>
               <a:spcAft>
-                <a:spcPts val="0"/>
-              </a:spcAft>
-              <a:buNone/>
-            </a:pPr>
-            <a:r>
-              <a:rPr lang="en"/>
-              <a:t>Derivado del punto anterior, un AiOS debería ser capaz de realizar actualizaciones cuando lo considerase conveniente, sin comprometer el trabajo que se está ejecutando por el usuario</a:t>
-            </a:r>
-            <a:endParaRPr/>
-          </a:p>
-          <a:p>
-            <a:pPr indent="0" lvl="0" marL="0" rtl="0" algn="l">
-              <a:spcBef>
-                <a:spcPts val="1600"/>
-              </a:spcBef>
-              <a:spcAft>
                 <a:spcPts val="1600"/>
               </a:spcAft>
               <a:buNone/>
@@ -9278,6 +9623,34 @@
           </a:p>
         </p:txBody>
       </p:sp>
+      <p:pic>
+        <p:nvPicPr>
+          <p:cNvPr id="159" name="Google Shape;159;p29"/>
+          <p:cNvPicPr preferRelativeResize="0"/>
+          <p:nvPr/>
+        </p:nvPicPr>
+        <p:blipFill>
+          <a:blip r:embed="rId3">
+            <a:alphaModFix/>
+          </a:blip>
+          <a:stretch>
+            <a:fillRect/>
+          </a:stretch>
+        </p:blipFill>
+        <p:spPr>
+          <a:xfrm>
+            <a:off x="2233600" y="2204025"/>
+            <a:ext cx="4676775" cy="2628900"/>
+          </a:xfrm>
+          <a:prstGeom prst="rect">
+            <a:avLst/>
+          </a:prstGeom>
+          <a:noFill/>
+          <a:ln>
+            <a:noFill/>
+          </a:ln>
+        </p:spPr>
+      </p:pic>
     </p:spTree>
   </p:cSld>
   <p:clrMapOvr>
@@ -9291,7 +9664,7 @@
   <p:cSld>
     <p:spTree>
       <p:nvGrpSpPr>
-        <p:cNvPr id="160" name="Shape 160"/>
+        <p:cNvPr id="163" name="Shape 163"/>
         <p:cNvGrpSpPr/>
         <p:nvPr/>
       </p:nvGrpSpPr>
@@ -9305,7 +9678,7 @@
       </p:grpSpPr>
       <p:sp>
         <p:nvSpPr>
-          <p:cNvPr id="161" name="Google Shape;161;p30"/>
+          <p:cNvPr id="164" name="Google Shape;164;p30"/>
           <p:cNvSpPr txBox="1"/>
           <p:nvPr>
             <p:ph idx="1" type="body"/>
@@ -9336,8 +9709,64 @@
               <a:buNone/>
             </a:pPr>
             <a:r>
+              <a:rPr b="1" lang="en">
+                <a:solidFill>
+                  <a:schemeClr val="accent6"/>
+                </a:solidFill>
+                <a:latin typeface="Alfa Slab One"/>
+                <a:ea typeface="Alfa Slab One"/>
+                <a:cs typeface="Alfa Slab One"/>
+                <a:sym typeface="Alfa Slab One"/>
+              </a:rPr>
+              <a:t>3. Manejo de memoria</a:t>
+            </a:r>
+            <a:endParaRPr b="1">
+              <a:solidFill>
+                <a:schemeClr val="accent6"/>
+              </a:solidFill>
+              <a:latin typeface="Alfa Slab One"/>
+              <a:ea typeface="Alfa Slab One"/>
+              <a:cs typeface="Alfa Slab One"/>
+              <a:sym typeface="Alfa Slab One"/>
+            </a:endParaRPr>
+          </a:p>
+          <a:p>
+            <a:pPr indent="0" lvl="0" marL="0" rtl="0" algn="l">
+              <a:spcBef>
+                <a:spcPts val="1600"/>
+              </a:spcBef>
+              <a:spcAft>
+                <a:spcPts val="0"/>
+              </a:spcAft>
+              <a:buNone/>
+            </a:pPr>
+            <a:r>
               <a:rPr lang="en"/>
-              <a:t>3. Manejo de memoria</a:t>
+              <a:t>Para un sistema operativo la tareas que se realizan a menudo no son muy diferentes, entonces a partir de eso el AiOS </a:t>
+            </a:r>
+            <a:r>
+              <a:rPr lang="en"/>
+              <a:t>podría</a:t>
+            </a:r>
+            <a:r>
+              <a:rPr lang="en"/>
+              <a:t> aprender patrones y manejar la memoria de la forma </a:t>
+            </a:r>
+            <a:r>
+              <a:rPr lang="en"/>
+              <a:t>más</a:t>
+            </a:r>
+            <a:r>
+              <a:rPr lang="en"/>
+              <a:t> </a:t>
+            </a:r>
+            <a:r>
+              <a:rPr lang="en"/>
+              <a:t>óptima</a:t>
+            </a:r>
+            <a:r>
+              <a:rPr lang="en"/>
+              <a:t> posible</a:t>
             </a:r>
             <a:endParaRPr/>
           </a:p>
@@ -9347,46 +9776,6 @@
                 <a:spcPts val="1600"/>
               </a:spcBef>
               <a:spcAft>
-                <a:spcPts val="0"/>
-              </a:spcAft>
-              <a:buNone/>
-            </a:pPr>
-            <a:r>
-              <a:rPr lang="en"/>
-              <a:t>Para un sistema operativo la tareas que se realizan a menudo no son muy diferentes, entonces a partir de eso el AiOS </a:t>
-            </a:r>
-            <a:r>
-              <a:rPr lang="en"/>
-              <a:t>podría</a:t>
-            </a:r>
-            <a:r>
-              <a:rPr lang="en"/>
-              <a:t> aprender patrones y manejar la memoria de la forma </a:t>
-            </a:r>
-            <a:r>
-              <a:rPr lang="en"/>
-              <a:t>más</a:t>
-            </a:r>
-            <a:r>
-              <a:rPr lang="en"/>
-              <a:t> </a:t>
-            </a:r>
-            <a:r>
-              <a:rPr lang="en"/>
-              <a:t>óptima</a:t>
-            </a:r>
-            <a:r>
-              <a:rPr lang="en"/>
-              <a:t> posible</a:t>
-            </a:r>
-            <a:endParaRPr/>
-          </a:p>
-          <a:p>
-            <a:pPr indent="0" lvl="0" marL="0" rtl="0" algn="l">
-              <a:spcBef>
-                <a:spcPts val="1600"/>
-              </a:spcBef>
-              <a:spcAft>
                 <a:spcPts val="1600"/>
               </a:spcAft>
               <a:buNone/>
@@ -9398,6 +9787,34 @@
           </a:p>
         </p:txBody>
       </p:sp>
+      <p:pic>
+        <p:nvPicPr>
+          <p:cNvPr id="165" name="Google Shape;165;p30"/>
+          <p:cNvPicPr preferRelativeResize="0"/>
+          <p:nvPr/>
+        </p:nvPicPr>
+        <p:blipFill>
+          <a:blip r:embed="rId3">
+            <a:alphaModFix/>
+          </a:blip>
+          <a:stretch>
+            <a:fillRect/>
+          </a:stretch>
+        </p:blipFill>
+        <p:spPr>
+          <a:xfrm>
+            <a:off x="2729430" y="2430230"/>
+            <a:ext cx="3938950" cy="2283275"/>
+          </a:xfrm>
+          <a:prstGeom prst="rect">
+            <a:avLst/>
+          </a:prstGeom>
+          <a:noFill/>
+          <a:ln>
+            <a:noFill/>
+          </a:ln>
+        </p:spPr>
+      </p:pic>
     </p:spTree>
   </p:cSld>
   <p:clrMapOvr>
@@ -9411,7 +9828,7 @@
   <p:cSld>
     <p:spTree>
       <p:nvGrpSpPr>
-        <p:cNvPr id="165" name="Shape 165"/>
+        <p:cNvPr id="169" name="Shape 169"/>
         <p:cNvGrpSpPr/>
         <p:nvPr/>
       </p:nvGrpSpPr>
@@ -9425,7 +9842,7 @@
       </p:grpSpPr>
       <p:sp>
         <p:nvSpPr>
-          <p:cNvPr id="166" name="Google Shape;166;p31"/>
+          <p:cNvPr id="170" name="Google Shape;170;p31"/>
           <p:cNvSpPr txBox="1"/>
           <p:nvPr>
             <p:ph idx="1" type="body"/>
@@ -9456,8 +9873,64 @@
               <a:buNone/>
             </a:pPr>
             <a:r>
+              <a:rPr lang="en">
+                <a:solidFill>
+                  <a:schemeClr val="accent6"/>
+                </a:solidFill>
+                <a:latin typeface="Alfa Slab One"/>
+                <a:ea typeface="Alfa Slab One"/>
+                <a:cs typeface="Alfa Slab One"/>
+                <a:sym typeface="Alfa Slab One"/>
+              </a:rPr>
+              <a:t>4. Administración y planeación de procesos</a:t>
+            </a:r>
+            <a:endParaRPr>
+              <a:solidFill>
+                <a:schemeClr val="accent6"/>
+              </a:solidFill>
+              <a:latin typeface="Alfa Slab One"/>
+              <a:ea typeface="Alfa Slab One"/>
+              <a:cs typeface="Alfa Slab One"/>
+              <a:sym typeface="Alfa Slab One"/>
+            </a:endParaRPr>
+          </a:p>
+          <a:p>
+            <a:pPr indent="0" lvl="0" marL="0" rtl="0" algn="l">
+              <a:spcBef>
+                <a:spcPts val="1600"/>
+              </a:spcBef>
+              <a:spcAft>
+                <a:spcPts val="0"/>
+              </a:spcAft>
+              <a:buNone/>
+            </a:pPr>
+            <a:r>
               <a:rPr lang="en"/>
-              <a:t>4. Administración y planeación de procesos</a:t>
+              <a:t>Los </a:t>
+            </a:r>
+            <a:r>
+              <a:rPr lang="en"/>
+              <a:t>AiOS </a:t>
+            </a:r>
+            <a:r>
+              <a:rPr lang="en"/>
+              <a:t>debería</a:t>
+            </a:r>
+            <a:r>
+              <a:rPr lang="en"/>
+              <a:t> poder saber </a:t>
+            </a:r>
+            <a:r>
+              <a:rPr lang="en"/>
+              <a:t>cuáles</a:t>
+            </a:r>
+            <a:r>
+              <a:rPr lang="en"/>
+              <a:t> procesos probablemente sean de mayor prioridad para el </a:t>
+            </a:r>
+            <a:r>
+              <a:rPr lang="en"/>
+              <a:t>usuario sin necesidad de que esto sea expresado explícitamente.</a:t>
             </a:r>
             <a:endParaRPr/>
           </a:p>
@@ -9467,82 +9940,6 @@
                 <a:spcPts val="1600"/>
               </a:spcBef>
               <a:spcAft>
-                <a:spcPts val="0"/>
-              </a:spcAft>
-              <a:buNone/>
-            </a:pPr>
-            <a:r>
-              <a:rPr lang="en"/>
-              <a:t>AiOS </a:t>
-            </a:r>
-            <a:r>
-              <a:rPr lang="en"/>
-              <a:t>debería</a:t>
-            </a:r>
-            <a:r>
-              <a:rPr lang="en"/>
-              <a:t> poder saber </a:t>
-            </a:r>
-            <a:r>
-              <a:rPr lang="en"/>
-              <a:t>cuáles</a:t>
-            </a:r>
-            <a:r>
-              <a:rPr lang="en"/>
-              <a:t> procesos probablemente sean de mayor prioridad para el </a:t>
-            </a:r>
-            <a:r>
-              <a:rPr lang="en"/>
-              <a:t>usuario</a:t>
-            </a:r>
-            <a:endParaRPr/>
-          </a:p>
-          <a:p>
-            <a:pPr indent="0" lvl="0" marL="0" rtl="0" algn="l">
-              <a:spcBef>
-                <a:spcPts val="1600"/>
-              </a:spcBef>
-              <a:spcAft>
-                <a:spcPts val="0"/>
-              </a:spcAft>
-              <a:buNone/>
-            </a:pPr>
-            <a:r>
-              <a:rPr lang="en"/>
-              <a:t>Un ejemplo de IA en un sistema operativo es CFEngene la cual como tal permite administrar nuestro sistema, aun no es tan avanzado para hacerlo sin que se le introduzcan ciertas instrucciones, pero es lo </a:t>
-            </a:r>
-            <a:r>
-              <a:rPr lang="en"/>
-              <a:t>suficientemente</a:t>
-            </a:r>
-            <a:r>
-              <a:rPr lang="en"/>
-              <a:t> inteligente como para detectar ciertas rutinas en los usuarios, este asigna a cada proceso una prioridad </a:t>
-            </a:r>
-            <a:r>
-              <a:rPr lang="en"/>
-              <a:t>según</a:t>
-            </a:r>
-            <a:r>
-              <a:rPr lang="en"/>
-              <a:t> la rutina del usuario y de esta forma administra los procesos de una forma relativamente </a:t>
-            </a:r>
-            <a:r>
-              <a:rPr lang="en"/>
-              <a:t>óptima</a:t>
-            </a:r>
-            <a:r>
-              <a:rPr lang="en"/>
-              <a:t>.</a:t>
-            </a:r>
-            <a:endParaRPr/>
-          </a:p>
-          <a:p>
-            <a:pPr indent="0" lvl="0" marL="0" rtl="0" algn="l">
-              <a:spcBef>
-                <a:spcPts val="1600"/>
-              </a:spcBef>
-              <a:spcAft>
                 <a:spcPts val="1600"/>
               </a:spcAft>
               <a:buNone/>
@@ -9554,6 +9951,33 @@
           </a:p>
         </p:txBody>
       </p:sp>
+      <p:pic>
+        <p:nvPicPr>
+          <p:cNvPr id="171" name="Google Shape;171;p31"/>
+          <p:cNvPicPr preferRelativeResize="0"/>
+          <p:nvPr/>
+        </p:nvPicPr>
+        <p:blipFill rotWithShape="1">
+          <a:blip r:embed="rId3">
+            <a:alphaModFix/>
+          </a:blip>
+          <a:srcRect b="0" l="0" r="0" t="14617"/>
+          <a:stretch/>
+        </p:blipFill>
+        <p:spPr>
+          <a:xfrm>
+            <a:off x="2607450" y="1705675"/>
+            <a:ext cx="3929100" cy="2863075"/>
+          </a:xfrm>
+          <a:prstGeom prst="rect">
+            <a:avLst/>
+          </a:prstGeom>
+          <a:noFill/>
+          <a:ln>
+            <a:noFill/>
+          </a:ln>
+        </p:spPr>
+      </p:pic>
     </p:spTree>
   </p:cSld>
   <p:clrMapOvr>
@@ -9712,7 +10136,7 @@
   <p:cSld>
     <p:spTree>
       <p:nvGrpSpPr>
-        <p:cNvPr id="170" name="Shape 170"/>
+        <p:cNvPr id="175" name="Shape 175"/>
         <p:cNvGrpSpPr/>
         <p:nvPr/>
       </p:nvGrpSpPr>
@@ -9726,7 +10150,7 @@
       </p:grpSpPr>
       <p:sp>
         <p:nvSpPr>
-          <p:cNvPr id="171" name="Google Shape;171;p32"/>
+          <p:cNvPr id="176" name="Google Shape;176;p32"/>
           <p:cNvSpPr txBox="1"/>
           <p:nvPr>
             <p:ph type="title"/>
@@ -9770,7 +10194,7 @@
       </p:sp>
       <p:sp>
         <p:nvSpPr>
-          <p:cNvPr id="172" name="Google Shape;172;p32"/>
+          <p:cNvPr id="177" name="Google Shape;177;p32"/>
           <p:cNvSpPr txBox="1"/>
           <p:nvPr>
             <p:ph idx="1" type="body"/>
@@ -9801,12 +10225,16 @@
               <a:buNone/>
             </a:pPr>
             <a:r>
+              <a:rPr b="1" lang="en"/>
+              <a:t>Siri</a:t>
+            </a:r>
+            <a:r>
               <a:rPr lang="en"/>
-              <a:t>Siri: El iphone de apple </a:t>
+              <a:t>: El iphone de apple </a:t>
             </a:r>
             <a:r>
               <a:rPr lang="en"/>
-              <a:t>con un asistente personal llamada "Siri" podemos hablarle como si se tratase de una persona cualquiera, con la misma naturalidad y espontaneidad, Siri no es unidireccional, no es un humano hablándole a una máquina sino que se produce una comunicación bidireccional, el sistema también nos habla, nos pregunta, propone, nos muestra posibilidades.</a:t>
+              <a:t>con un asistente personal llamada "Siri" podemos hablarle como si se tratase de una persona cualquiera, con la misma naturalidad y espontaneidad, Siri no es unidireccional: No es un humano hablándole a una máquina sino que se produce una comunicación bidireccional. El sistema también nos habla, nos pregunta, propone, nos muestra posibilidades.</a:t>
             </a:r>
             <a:endParaRPr/>
           </a:p>
@@ -9821,102 +10249,6 @@
 </file>
 
 <file path=ppt/slides/slide21.xml><?xml version="1.0" encoding="utf-8"?>
-<p:sld xmlns:a="http://schemas.openxmlformats.org/drawingml/2006/main" xmlns:r="http://schemas.openxmlformats.org/officeDocument/2006/relationships" xmlns:mc="http://schemas.openxmlformats.org/markup-compatibility/2006" xmlns:mv="urn:schemas-microsoft-com:mac:vml" xmlns:p="http://schemas.openxmlformats.org/presentationml/2006/main" xmlns:c="http://schemas.openxmlformats.org/drawingml/2006/chart" xmlns:dgm="http://schemas.openxmlformats.org/drawingml/2006/diagram" xmlns:o="urn:schemas-microsoft-com:office:office" xmlns:v="urn:schemas-microsoft-com:vml" xmlns:pvml="urn:schemas-microsoft-com:office:powerpoint" xmlns:com="http://schemas.openxmlformats.org/drawingml/2006/compatibility" xmlns:p14="http://schemas.microsoft.com/office/powerpoint/2010/main" xmlns:p15="http://schemas.microsoft.com/office/powerpoint/2012/main">
-  <p:cSld>
-    <p:spTree>
-      <p:nvGrpSpPr>
-        <p:cNvPr id="176" name="Shape 176"/>
-        <p:cNvGrpSpPr/>
-        <p:nvPr/>
-      </p:nvGrpSpPr>
-      <p:grpSpPr>
-        <a:xfrm>
-          <a:off x="0" y="0"/>
-          <a:ext cx="0" cy="0"/>
-          <a:chOff x="0" y="0"/>
-          <a:chExt cx="0" cy="0"/>
-        </a:xfrm>
-      </p:grpSpPr>
-      <p:sp>
-        <p:nvSpPr>
-          <p:cNvPr id="177" name="Google Shape;177;p33"/>
-          <p:cNvSpPr txBox="1"/>
-          <p:nvPr>
-            <p:ph idx="1" type="body"/>
-          </p:nvPr>
-        </p:nvSpPr>
-        <p:spPr>
-          <a:xfrm>
-            <a:off x="311700" y="1152475"/>
-            <a:ext cx="8520600" cy="3416400"/>
-          </a:xfrm>
-          <a:prstGeom prst="rect">
-            <a:avLst/>
-          </a:prstGeom>
-        </p:spPr>
-        <p:txBody>
-          <a:bodyPr anchorCtr="0" anchor="t" bIns="91425" lIns="91425" spcFirstLastPara="1" rIns="91425" wrap="square" tIns="91425">
-            <a:noAutofit/>
-          </a:bodyPr>
-          <a:lstStyle/>
-          <a:p>
-            <a:pPr indent="0" lvl="0" marL="0" rtl="0" algn="l">
-              <a:spcBef>
-                <a:spcPts val="0"/>
-              </a:spcBef>
-              <a:spcAft>
-                <a:spcPts val="0"/>
-              </a:spcAft>
-              <a:buNone/>
-            </a:pPr>
-            <a:r>
-              <a:rPr lang="en"/>
-              <a:t>Asistente de google: Entre las funcionalidades que podemos encontrar en este asistente, encontramos la más evidente, la cual será la de buscar información, mientras que por otra parte, vamos a poder realizar diferentes acciones en nuestro dispositivo, tales como reproducir música, buscar imágenes de Google Fotos, y demás funciones que esperamos Google especifique más adelante.</a:t>
-            </a:r>
-            <a:endParaRPr/>
-          </a:p>
-          <a:p>
-            <a:pPr indent="0" lvl="0" marL="0" rtl="0" algn="l">
-              <a:spcBef>
-                <a:spcPts val="1600"/>
-              </a:spcBef>
-              <a:spcAft>
-                <a:spcPts val="0"/>
-              </a:spcAft>
-              <a:buNone/>
-            </a:pPr>
-            <a:r>
-              <a:rPr lang="en"/>
-              <a:t>El diseño de Google Assistant, será muy similar al que podríamos encontrar en una aplicación de chat, por tanto, la experiencia con este asistente debería ser más que satisfactoria, teniendo en cuenta la enorme cantidad de información con la que cuenta Google en la actualidad.</a:t>
-            </a:r>
-            <a:endParaRPr/>
-          </a:p>
-          <a:p>
-            <a:pPr indent="0" lvl="0" marL="0" rtl="0" algn="l">
-              <a:spcBef>
-                <a:spcPts val="1600"/>
-              </a:spcBef>
-              <a:spcAft>
-                <a:spcPts val="1600"/>
-              </a:spcAft>
-              <a:buNone/>
-            </a:pPr>
-            <a:r>
-              <a:t/>
-            </a:r>
-            <a:endParaRPr/>
-          </a:p>
-        </p:txBody>
-      </p:sp>
-    </p:spTree>
-  </p:cSld>
-  <p:clrMapOvr>
-    <a:masterClrMapping/>
-  </p:clrMapOvr>
-</p:sld>
-</file>
-
-<file path=ppt/slides/slide22.xml><?xml version="1.0" encoding="utf-8"?>
 <p:sld xmlns:a="http://schemas.openxmlformats.org/drawingml/2006/main" xmlns:r="http://schemas.openxmlformats.org/officeDocument/2006/relationships" xmlns:mc="http://schemas.openxmlformats.org/markup-compatibility/2006" xmlns:mv="urn:schemas-microsoft-com:mac:vml" xmlns:p="http://schemas.openxmlformats.org/presentationml/2006/main" xmlns:c="http://schemas.openxmlformats.org/drawingml/2006/chart" xmlns:dgm="http://schemas.openxmlformats.org/drawingml/2006/diagram" xmlns:o="urn:schemas-microsoft-com:office:office" xmlns:v="urn:schemas-microsoft-com:vml" xmlns:pvml="urn:schemas-microsoft-com:office:powerpoint" xmlns:com="http://schemas.openxmlformats.org/drawingml/2006/compatibility" xmlns:p14="http://schemas.microsoft.com/office/powerpoint/2010/main" xmlns:p15="http://schemas.microsoft.com/office/powerpoint/2012/main">
   <p:cSld>
     <p:spTree>
@@ -9935,16 +10267,16 @@
       </p:grpSpPr>
       <p:sp>
         <p:nvSpPr>
-          <p:cNvPr id="182" name="Google Shape;182;p34"/>
+          <p:cNvPr id="182" name="Google Shape;182;p33"/>
           <p:cNvSpPr txBox="1"/>
           <p:nvPr>
-            <p:ph type="title"/>
+            <p:ph idx="1" type="body"/>
           </p:nvPr>
         </p:nvSpPr>
         <p:spPr>
           <a:xfrm>
-            <a:off x="311700" y="445025"/>
-            <a:ext cx="8520600" cy="572700"/>
+            <a:off x="311700" y="1152475"/>
+            <a:ext cx="8520600" cy="3416400"/>
           </a:xfrm>
           <a:prstGeom prst="rect">
             <a:avLst/>
@@ -9966,8 +10298,108 @@
               <a:buNone/>
             </a:pPr>
             <a:r>
+              <a:rPr b="1" lang="en"/>
+              <a:t>Asistente de google:</a:t>
+            </a:r>
+            <a:r>
               <a:rPr lang="en"/>
-              <a:t>En conlcusión</a:t>
+              <a:t> Entre las funcionalidades que podemos encontrar en este asistente, encontramos la más evidente, la cual será la de buscar información, mientras que por otra parte, vamos a poder realizar diferentes acciones en nuestro dispositivo, tales como reproducir música, buscar imágenes de Google Fotos, y demás funciones que esperamos Google especifique más adelante.</a:t>
+            </a:r>
+            <a:endParaRPr/>
+          </a:p>
+          <a:p>
+            <a:pPr indent="0" lvl="0" marL="0" rtl="0" algn="l">
+              <a:spcBef>
+                <a:spcPts val="1600"/>
+              </a:spcBef>
+              <a:spcAft>
+                <a:spcPts val="0"/>
+              </a:spcAft>
+              <a:buNone/>
+            </a:pPr>
+            <a:r>
+              <a:rPr lang="en"/>
+              <a:t>El diseño de Google Assistant, será muy similar al que podríamos encontrar en una aplicación de chat, por tanto, la experiencia con este asistente debería ser más que satisfactoria, teniendo en cuenta la enorme cantidad de información con la que cuenta Google en la actualidad.</a:t>
+            </a:r>
+            <a:endParaRPr/>
+          </a:p>
+          <a:p>
+            <a:pPr indent="0" lvl="0" marL="0" rtl="0" algn="l">
+              <a:spcBef>
+                <a:spcPts val="1600"/>
+              </a:spcBef>
+              <a:spcAft>
+                <a:spcPts val="1600"/>
+              </a:spcAft>
+              <a:buNone/>
+            </a:pPr>
+            <a:r>
+              <a:t/>
+            </a:r>
+            <a:endParaRPr/>
+          </a:p>
+        </p:txBody>
+      </p:sp>
+    </p:spTree>
+  </p:cSld>
+  <p:clrMapOvr>
+    <a:masterClrMapping/>
+  </p:clrMapOvr>
+</p:sld>
+</file>
+
+<file path=ppt/slides/slide22.xml><?xml version="1.0" encoding="utf-8"?>
+<p:sld xmlns:a="http://schemas.openxmlformats.org/drawingml/2006/main" xmlns:r="http://schemas.openxmlformats.org/officeDocument/2006/relationships" xmlns:mc="http://schemas.openxmlformats.org/markup-compatibility/2006" xmlns:mv="urn:schemas-microsoft-com:mac:vml" xmlns:p="http://schemas.openxmlformats.org/presentationml/2006/main" xmlns:c="http://schemas.openxmlformats.org/drawingml/2006/chart" xmlns:dgm="http://schemas.openxmlformats.org/drawingml/2006/diagram" xmlns:o="urn:schemas-microsoft-com:office:office" xmlns:v="urn:schemas-microsoft-com:vml" xmlns:pvml="urn:schemas-microsoft-com:office:powerpoint" xmlns:com="http://schemas.openxmlformats.org/drawingml/2006/compatibility" xmlns:p14="http://schemas.microsoft.com/office/powerpoint/2010/main" xmlns:p15="http://schemas.microsoft.com/office/powerpoint/2012/main">
+  <p:cSld>
+    <p:spTree>
+      <p:nvGrpSpPr>
+        <p:cNvPr id="186" name="Shape 186"/>
+        <p:cNvGrpSpPr/>
+        <p:nvPr/>
+      </p:nvGrpSpPr>
+      <p:grpSpPr>
+        <a:xfrm>
+          <a:off x="0" y="0"/>
+          <a:ext cx="0" cy="0"/>
+          <a:chOff x="0" y="0"/>
+          <a:chExt cx="0" cy="0"/>
+        </a:xfrm>
+      </p:grpSpPr>
+      <p:sp>
+        <p:nvSpPr>
+          <p:cNvPr id="187" name="Google Shape;187;p34"/>
+          <p:cNvSpPr txBox="1"/>
+          <p:nvPr>
+            <p:ph type="title"/>
+          </p:nvPr>
+        </p:nvSpPr>
+        <p:spPr>
+          <a:xfrm>
+            <a:off x="311700" y="445025"/>
+            <a:ext cx="8520600" cy="774900"/>
+          </a:xfrm>
+          <a:prstGeom prst="rect">
+            <a:avLst/>
+          </a:prstGeom>
+        </p:spPr>
+        <p:txBody>
+          <a:bodyPr anchorCtr="0" anchor="t" bIns="91425" lIns="91425" spcFirstLastPara="1" rIns="91425" wrap="square" tIns="91425">
+            <a:noAutofit/>
+          </a:bodyPr>
+          <a:lstStyle/>
+          <a:p>
+            <a:pPr indent="0" lvl="0" marL="0" rtl="0" algn="ctr">
+              <a:spcBef>
+                <a:spcPts val="0"/>
+              </a:spcBef>
+              <a:spcAft>
+                <a:spcPts val="0"/>
+              </a:spcAft>
+              <a:buNone/>
+            </a:pPr>
+            <a:r>
+              <a:rPr lang="en"/>
+              <a:t>Inicios de sistemas operativos con IA</a:t>
             </a:r>
             <a:endParaRPr/>
           </a:p>
@@ -9975,7 +10407,7 @@
       </p:sp>
       <p:sp>
         <p:nvSpPr>
-          <p:cNvPr id="183" name="Google Shape;183;p34"/>
+          <p:cNvPr id="188" name="Google Shape;188;p34"/>
           <p:cNvSpPr txBox="1"/>
           <p:nvPr>
             <p:ph idx="1" type="body"/>
@@ -9983,8 +10415,8 @@
         </p:nvSpPr>
         <p:spPr>
           <a:xfrm>
-            <a:off x="311700" y="1152475"/>
-            <a:ext cx="8520600" cy="3416400"/>
+            <a:off x="311700" y="1434725"/>
+            <a:ext cx="8520600" cy="3134100"/>
           </a:xfrm>
           <a:prstGeom prst="rect">
             <a:avLst/>
@@ -10007,7 +10439,51 @@
             </a:pPr>
             <a:r>
               <a:rPr lang="en"/>
-              <a:t>En la actualidad la mayoría de los sistemas operativos.</a:t>
+              <a:t>En </a:t>
+            </a:r>
+            <a:r>
+              <a:rPr b="1" lang="en"/>
+              <a:t>android </a:t>
+            </a:r>
+            <a:r>
+              <a:rPr lang="en"/>
+              <a:t>se </a:t>
+            </a:r>
+            <a:r>
+              <a:rPr lang="en"/>
+              <a:t>implementó</a:t>
+            </a:r>
+            <a:r>
+              <a:rPr lang="en"/>
+              <a:t> que detecte las horas en que se ocupa </a:t>
+            </a:r>
+            <a:r>
+              <a:rPr lang="en"/>
+              <a:t>más</a:t>
+            </a:r>
+            <a:r>
+              <a:rPr lang="en"/>
+              <a:t> el celular y entonces cuando no son estas horas el celular </a:t>
+            </a:r>
+            <a:r>
+              <a:rPr b="1" lang="en"/>
+              <a:t>ahorra </a:t>
+            </a:r>
+            <a:r>
+              <a:rPr b="1" lang="en"/>
+              <a:t>energía</a:t>
+            </a:r>
+            <a:r>
+              <a:rPr lang="en"/>
+              <a:t>, además de que aprende de cual es el </a:t>
+            </a:r>
+            <a:r>
+              <a:rPr b="1" lang="en"/>
+              <a:t>peso de las aplicaciones</a:t>
+            </a:r>
+            <a:r>
+              <a:rPr lang="en"/>
+              <a:t> que descargas más a menudo y así te recomienda varias del mcomputerismo peso. </a:t>
             </a:r>
             <a:endParaRPr/>
           </a:p>
@@ -10022,8 +10498,7 @@
               <a:buNone/>
             </a:pPr>
             <a:r>
-              <a:rPr lang="en"/>
-              <a:t>En algún punto inteligencia artificial va a ser participe en cómo en software interactúa con el hardware y con sí mismo, no sólo con los humanos. </a:t>
+              <a:t/>
             </a:r>
             <a:endParaRPr/>
           </a:p>
@@ -10038,13 +10513,40 @@
               <a:buNone/>
             </a:pPr>
             <a:r>
-              <a:rPr lang="en"/>
-              <a:t>No esta muy lejos de la realidad pensar que en algún futuro vamos a ser capaces de usar genuinos sistemas operativos basados en inteligencia artificial. De momento podemos conformarnos con los sorpresivos avances que se han dado hasta el momento.</a:t>
+              <a:t/>
             </a:r>
             <a:endParaRPr/>
           </a:p>
         </p:txBody>
       </p:sp>
+      <p:pic>
+        <p:nvPicPr>
+          <p:cNvPr id="189" name="Google Shape;189;p34"/>
+          <p:cNvPicPr preferRelativeResize="0"/>
+          <p:nvPr/>
+        </p:nvPicPr>
+        <p:blipFill>
+          <a:blip r:embed="rId3">
+            <a:alphaModFix/>
+          </a:blip>
+          <a:stretch>
+            <a:fillRect/>
+          </a:stretch>
+        </p:blipFill>
+        <p:spPr>
+          <a:xfrm>
+            <a:off x="2585650" y="2840153"/>
+            <a:ext cx="3972700" cy="2232075"/>
+          </a:xfrm>
+          <a:prstGeom prst="rect">
+            <a:avLst/>
+          </a:prstGeom>
+          <a:noFill/>
+          <a:ln>
+            <a:noFill/>
+          </a:ln>
+        </p:spPr>
+      </p:pic>
     </p:spTree>
   </p:cSld>
   <p:clrMapOvr>
@@ -10058,7 +10560,7 @@
   <p:cSld>
     <p:spTree>
       <p:nvGrpSpPr>
-        <p:cNvPr id="187" name="Shape 187"/>
+        <p:cNvPr id="193" name="Shape 193"/>
         <p:cNvGrpSpPr/>
         <p:nvPr/>
       </p:nvGrpSpPr>
@@ -10072,16 +10574,16 @@
       </p:grpSpPr>
       <p:sp>
         <p:nvSpPr>
-          <p:cNvPr id="188" name="Google Shape;188;p35"/>
+          <p:cNvPr id="194" name="Google Shape;194;p35"/>
           <p:cNvSpPr txBox="1"/>
           <p:nvPr>
-            <p:ph type="title"/>
+            <p:ph idx="1" type="body"/>
           </p:nvPr>
         </p:nvSpPr>
         <p:spPr>
           <a:xfrm>
-            <a:off x="311700" y="445025"/>
-            <a:ext cx="8520600" cy="572700"/>
+            <a:off x="350750" y="0"/>
+            <a:ext cx="8520600" cy="3416400"/>
           </a:xfrm>
           <a:prstGeom prst="rect">
             <a:avLst/>
@@ -10098,21 +10600,190 @@
                 <a:spcPts val="0"/>
               </a:spcBef>
               <a:spcAft>
-                <a:spcPts val="0"/>
+                <a:spcPts val="1600"/>
               </a:spcAft>
               <a:buNone/>
             </a:pPr>
             <a:r>
               <a:rPr lang="en"/>
-              <a:t>Fuentes de Consulta</a:t>
+              <a:t>En </a:t>
+            </a:r>
+            <a:r>
+              <a:rPr b="1" lang="en"/>
+              <a:t>Huawei </a:t>
+            </a:r>
+            <a:r>
+              <a:rPr lang="en"/>
+              <a:t>se </a:t>
+            </a:r>
+            <a:r>
+              <a:rPr lang="en"/>
+              <a:t>está</a:t>
+            </a:r>
+            <a:r>
+              <a:rPr lang="en"/>
+              <a:t> implementando </a:t>
+            </a:r>
+            <a:r>
+              <a:rPr lang="en"/>
+              <a:t>tecnología</a:t>
+            </a:r>
+            <a:r>
+              <a:rPr lang="en"/>
+              <a:t> la cual permite al celular aprender de ti y </a:t>
+            </a:r>
+            <a:r>
+              <a:rPr lang="en"/>
+              <a:t>así</a:t>
+            </a:r>
+            <a:r>
+              <a:rPr lang="en"/>
+              <a:t> cuando aprenda que ciertos </a:t>
+            </a:r>
+            <a:r>
+              <a:rPr lang="en"/>
+              <a:t>días</a:t>
+            </a:r>
+            <a:r>
+              <a:rPr lang="en"/>
+              <a:t> tu ocupas cierta </a:t>
+            </a:r>
+            <a:r>
+              <a:rPr lang="en"/>
+              <a:t>aplicación</a:t>
+            </a:r>
+            <a:r>
+              <a:rPr lang="en"/>
+              <a:t> a tal hora el celular </a:t>
+            </a:r>
+            <a:r>
+              <a:rPr lang="en"/>
+              <a:t>será</a:t>
+            </a:r>
+            <a:r>
+              <a:rPr lang="en"/>
+              <a:t> capaz de </a:t>
+            </a:r>
+            <a:r>
+              <a:rPr b="1" lang="en"/>
+              <a:t>precargar la </a:t>
+            </a:r>
+            <a:r>
+              <a:rPr b="1" lang="en"/>
+              <a:t>aplicación</a:t>
+            </a:r>
+            <a:r>
+              <a:rPr b="1" lang="en"/>
+              <a:t> </a:t>
+            </a:r>
+            <a:r>
+              <a:rPr lang="en"/>
+              <a:t>para que </a:t>
+            </a:r>
+            <a:r>
+              <a:rPr lang="en"/>
+              <a:t>esté</a:t>
+            </a:r>
+            <a:r>
+              <a:rPr lang="en"/>
+              <a:t> completamente lista cuando lo necesites, </a:t>
+            </a:r>
+            <a:r>
+              <a:rPr lang="en"/>
+              <a:t>además</a:t>
+            </a:r>
+            <a:r>
+              <a:rPr lang="en"/>
+              <a:t> de </a:t>
+            </a:r>
+            <a:r>
+              <a:rPr b="1" lang="en"/>
+              <a:t>ahorrar </a:t>
+            </a:r>
+            <a:r>
+              <a:rPr b="1" lang="en"/>
+              <a:t>batería</a:t>
+            </a:r>
+            <a:r>
+              <a:rPr lang="en"/>
+              <a:t> en las horas que casi no ocupes el celular y </a:t>
+            </a:r>
+            <a:r>
+              <a:rPr lang="en"/>
+              <a:t>también es capaza de usar la IA para mejorar los resultados de las </a:t>
+            </a:r>
+            <a:r>
+              <a:rPr b="1" lang="en"/>
+              <a:t>fotos</a:t>
+            </a:r>
+            <a:r>
+              <a:rPr lang="en"/>
+              <a:t>.</a:t>
+            </a:r>
+            <a:r>
+              <a:rPr lang="en"/>
+              <a:t> </a:t>
             </a:r>
             <a:endParaRPr/>
           </a:p>
         </p:txBody>
       </p:sp>
+      <p:pic>
+        <p:nvPicPr>
+          <p:cNvPr id="195" name="Google Shape;195;p35"/>
+          <p:cNvPicPr preferRelativeResize="0"/>
+          <p:nvPr/>
+        </p:nvPicPr>
+        <p:blipFill>
+          <a:blip r:embed="rId3">
+            <a:alphaModFix/>
+          </a:blip>
+          <a:stretch>
+            <a:fillRect/>
+          </a:stretch>
+        </p:blipFill>
+        <p:spPr>
+          <a:xfrm>
+            <a:off x="2847500" y="1978825"/>
+            <a:ext cx="3449001" cy="2290275"/>
+          </a:xfrm>
+          <a:prstGeom prst="rect">
+            <a:avLst/>
+          </a:prstGeom>
+          <a:noFill/>
+          <a:ln>
+            <a:noFill/>
+          </a:ln>
+        </p:spPr>
+      </p:pic>
+    </p:spTree>
+  </p:cSld>
+  <p:clrMapOvr>
+    <a:masterClrMapping/>
+  </p:clrMapOvr>
+</p:sld>
+</file>
+
+<file path=ppt/slides/slide24.xml><?xml version="1.0" encoding="utf-8"?>
+<p:sld xmlns:a="http://schemas.openxmlformats.org/drawingml/2006/main" xmlns:r="http://schemas.openxmlformats.org/officeDocument/2006/relationships" xmlns:mc="http://schemas.openxmlformats.org/markup-compatibility/2006" xmlns:mv="urn:schemas-microsoft-com:mac:vml" xmlns:p="http://schemas.openxmlformats.org/presentationml/2006/main" xmlns:c="http://schemas.openxmlformats.org/drawingml/2006/chart" xmlns:dgm="http://schemas.openxmlformats.org/drawingml/2006/diagram" xmlns:o="urn:schemas-microsoft-com:office:office" xmlns:v="urn:schemas-microsoft-com:vml" xmlns:pvml="urn:schemas-microsoft-com:office:powerpoint" xmlns:com="http://schemas.openxmlformats.org/drawingml/2006/compatibility" xmlns:p14="http://schemas.microsoft.com/office/powerpoint/2010/main" xmlns:p15="http://schemas.microsoft.com/office/powerpoint/2012/main">
+  <p:cSld>
+    <p:spTree>
+      <p:nvGrpSpPr>
+        <p:cNvPr id="199" name="Shape 199"/>
+        <p:cNvGrpSpPr/>
+        <p:nvPr/>
+      </p:nvGrpSpPr>
+      <p:grpSpPr>
+        <a:xfrm>
+          <a:off x="0" y="0"/>
+          <a:ext cx="0" cy="0"/>
+          <a:chOff x="0" y="0"/>
+          <a:chExt cx="0" cy="0"/>
+        </a:xfrm>
+      </p:grpSpPr>
       <p:sp>
         <p:nvSpPr>
-          <p:cNvPr id="189" name="Google Shape;189;p35"/>
+          <p:cNvPr id="200" name="Google Shape;200;p36"/>
           <p:cNvSpPr txBox="1"/>
           <p:nvPr>
             <p:ph idx="1" type="body"/>
@@ -10143,204 +10814,512 @@
               <a:buNone/>
             </a:pPr>
             <a:r>
-              <a:rPr lang="en" sz="1100" u="sng">
+              <a:rPr lang="en"/>
+              <a:t>Un ejemplo de IA en un sistema operativo es </a:t>
+            </a:r>
+            <a:r>
+              <a:rPr b="1" lang="en"/>
+              <a:t>CFEngene</a:t>
+            </a:r>
+            <a:r>
+              <a:rPr lang="en"/>
+              <a:t> la cual como tal permite </a:t>
+            </a:r>
+            <a:r>
+              <a:rPr b="1" lang="en"/>
+              <a:t>administrar </a:t>
+            </a:r>
+            <a:r>
+              <a:rPr lang="en"/>
+              <a:t>nuestro sistema, aun no es tan avanzado para hacerlo sin que se le introduzcan ciertas instrucciones, pero es lo suficientemente inteligente como para </a:t>
+            </a:r>
+            <a:r>
+              <a:rPr b="1" lang="en"/>
+              <a:t>detectar ciertas rutinas </a:t>
+            </a:r>
+            <a:r>
+              <a:rPr lang="en"/>
+              <a:t>en los usuarios, este sirve para administrar un sistema operativo y además la IA aprende de cómo el administrador en sistemas resuelve un problema para después el hacerlo y para todo esto trabaja directamente con el </a:t>
+            </a:r>
+            <a:r>
+              <a:rPr b="1" lang="en"/>
+              <a:t>kernel de linux, </a:t>
+            </a:r>
+            <a:r>
+              <a:rPr lang="en"/>
+              <a:t>además asigna a cada proceso una prioridad según la rutina del usuario y de esta forma administra los procesos de una forma relativamente óptima.</a:t>
+            </a:r>
+            <a:endParaRPr/>
+          </a:p>
+          <a:p>
+            <a:pPr indent="0" lvl="0" marL="0" rtl="0" algn="l">
+              <a:spcBef>
+                <a:spcPts val="1600"/>
+              </a:spcBef>
+              <a:spcAft>
+                <a:spcPts val="1600"/>
+              </a:spcAft>
+              <a:buNone/>
+            </a:pPr>
+            <a:r>
+              <a:t/>
+            </a:r>
+            <a:endParaRPr/>
+          </a:p>
+        </p:txBody>
+      </p:sp>
+    </p:spTree>
+  </p:cSld>
+  <p:clrMapOvr>
+    <a:masterClrMapping/>
+  </p:clrMapOvr>
+</p:sld>
+</file>
+
+<file path=ppt/slides/slide25.xml><?xml version="1.0" encoding="utf-8"?>
+<p:sld xmlns:a="http://schemas.openxmlformats.org/drawingml/2006/main" xmlns:r="http://schemas.openxmlformats.org/officeDocument/2006/relationships" xmlns:mc="http://schemas.openxmlformats.org/markup-compatibility/2006" xmlns:mv="urn:schemas-microsoft-com:mac:vml" xmlns:p="http://schemas.openxmlformats.org/presentationml/2006/main" xmlns:c="http://schemas.openxmlformats.org/drawingml/2006/chart" xmlns:dgm="http://schemas.openxmlformats.org/drawingml/2006/diagram" xmlns:o="urn:schemas-microsoft-com:office:office" xmlns:v="urn:schemas-microsoft-com:vml" xmlns:pvml="urn:schemas-microsoft-com:office:powerpoint" xmlns:com="http://schemas.openxmlformats.org/drawingml/2006/compatibility" xmlns:p14="http://schemas.microsoft.com/office/powerpoint/2010/main" xmlns:p15="http://schemas.microsoft.com/office/powerpoint/2012/main">
+  <p:cSld>
+    <p:spTree>
+      <p:nvGrpSpPr>
+        <p:cNvPr id="204" name="Shape 204"/>
+        <p:cNvGrpSpPr/>
+        <p:nvPr/>
+      </p:nvGrpSpPr>
+      <p:grpSpPr>
+        <a:xfrm>
+          <a:off x="0" y="0"/>
+          <a:ext cx="0" cy="0"/>
+          <a:chOff x="0" y="0"/>
+          <a:chExt cx="0" cy="0"/>
+        </a:xfrm>
+      </p:grpSpPr>
+      <p:sp>
+        <p:nvSpPr>
+          <p:cNvPr id="205" name="Google Shape;205;p37"/>
+          <p:cNvSpPr txBox="1"/>
+          <p:nvPr>
+            <p:ph type="title"/>
+          </p:nvPr>
+        </p:nvSpPr>
+        <p:spPr>
+          <a:xfrm>
+            <a:off x="311700" y="445025"/>
+            <a:ext cx="8520600" cy="572700"/>
+          </a:xfrm>
+          <a:prstGeom prst="rect">
+            <a:avLst/>
+          </a:prstGeom>
+        </p:spPr>
+        <p:txBody>
+          <a:bodyPr anchorCtr="0" anchor="t" bIns="91425" lIns="91425" spcFirstLastPara="1" rIns="91425" wrap="square" tIns="91425">
+            <a:noAutofit/>
+          </a:bodyPr>
+          <a:lstStyle/>
+          <a:p>
+            <a:pPr indent="0" lvl="0" marL="0" rtl="0" algn="l">
+              <a:spcBef>
+                <a:spcPts val="0"/>
+              </a:spcBef>
+              <a:spcAft>
+                <a:spcPts val="0"/>
+              </a:spcAft>
+              <a:buNone/>
+            </a:pPr>
+            <a:r>
+              <a:rPr lang="en"/>
+              <a:t>En conlcusión</a:t>
+            </a:r>
+            <a:endParaRPr/>
+          </a:p>
+        </p:txBody>
+      </p:sp>
+      <p:sp>
+        <p:nvSpPr>
+          <p:cNvPr id="206" name="Google Shape;206;p37"/>
+          <p:cNvSpPr txBox="1"/>
+          <p:nvPr>
+            <p:ph idx="1" type="body"/>
+          </p:nvPr>
+        </p:nvSpPr>
+        <p:spPr>
+          <a:xfrm>
+            <a:off x="311700" y="1152475"/>
+            <a:ext cx="8520600" cy="3416400"/>
+          </a:xfrm>
+          <a:prstGeom prst="rect">
+            <a:avLst/>
+          </a:prstGeom>
+        </p:spPr>
+        <p:txBody>
+          <a:bodyPr anchorCtr="0" anchor="t" bIns="91425" lIns="91425" spcFirstLastPara="1" rIns="91425" wrap="square" tIns="91425">
+            <a:noAutofit/>
+          </a:bodyPr>
+          <a:lstStyle/>
+          <a:p>
+            <a:pPr indent="0" lvl="0" marL="0" rtl="0" algn="l">
+              <a:spcBef>
+                <a:spcPts val="0"/>
+              </a:spcBef>
+              <a:spcAft>
+                <a:spcPts val="0"/>
+              </a:spcAft>
+              <a:buNone/>
+            </a:pPr>
+            <a:r>
+              <a:rPr lang="en"/>
+              <a:t>En la actualidad varios sistemas operativos tienen funcionalidades propias de la IA como son interfaces de usuario o aplicaciones optimizadas por la misma.</a:t>
+            </a:r>
+            <a:endParaRPr/>
+          </a:p>
+          <a:p>
+            <a:pPr indent="0" lvl="0" marL="0" rtl="0" algn="l">
+              <a:spcBef>
+                <a:spcPts val="1600"/>
+              </a:spcBef>
+              <a:spcAft>
+                <a:spcPts val="0"/>
+              </a:spcAft>
+              <a:buNone/>
+            </a:pPr>
+            <a:r>
+              <a:rPr lang="en"/>
+              <a:t>En algún punto inteligencia artificial va a ser participe en cómo el software interactúa con el hardware y con sí mismo, no sólo con los humanos. </a:t>
+            </a:r>
+            <a:endParaRPr/>
+          </a:p>
+          <a:p>
+            <a:pPr indent="0" lvl="0" marL="0" rtl="0" algn="l">
+              <a:spcBef>
+                <a:spcPts val="1600"/>
+              </a:spcBef>
+              <a:spcAft>
+                <a:spcPts val="1600"/>
+              </a:spcAft>
+              <a:buNone/>
+            </a:pPr>
+            <a:r>
+              <a:rPr lang="en"/>
+              <a:t>No </a:t>
+            </a:r>
+            <a:r>
+              <a:rPr lang="en"/>
+              <a:t>está</a:t>
+            </a:r>
+            <a:r>
+              <a:rPr lang="en"/>
+              <a:t> muy lejos de la realidad pensar que en algún futuro vamos a ser capaces de usar genuinos sistemas operativos basados en inteligencia artificial. De momento podemos conformarnos con los sorpresivos avances que se han dado hasta el momento.</a:t>
+            </a:r>
+            <a:endParaRPr/>
+          </a:p>
+        </p:txBody>
+      </p:sp>
+    </p:spTree>
+  </p:cSld>
+  <p:clrMapOvr>
+    <a:masterClrMapping/>
+  </p:clrMapOvr>
+</p:sld>
+</file>
+
+<file path=ppt/slides/slide26.xml><?xml version="1.0" encoding="utf-8"?>
+<p:sld xmlns:a="http://schemas.openxmlformats.org/drawingml/2006/main" xmlns:r="http://schemas.openxmlformats.org/officeDocument/2006/relationships" xmlns:mc="http://schemas.openxmlformats.org/markup-compatibility/2006" xmlns:mv="urn:schemas-microsoft-com:mac:vml" xmlns:p="http://schemas.openxmlformats.org/presentationml/2006/main" xmlns:c="http://schemas.openxmlformats.org/drawingml/2006/chart" xmlns:dgm="http://schemas.openxmlformats.org/drawingml/2006/diagram" xmlns:o="urn:schemas-microsoft-com:office:office" xmlns:v="urn:schemas-microsoft-com:vml" xmlns:pvml="urn:schemas-microsoft-com:office:powerpoint" xmlns:com="http://schemas.openxmlformats.org/drawingml/2006/compatibility" xmlns:p14="http://schemas.microsoft.com/office/powerpoint/2010/main" xmlns:p15="http://schemas.microsoft.com/office/powerpoint/2012/main">
+  <p:cSld>
+    <p:spTree>
+      <p:nvGrpSpPr>
+        <p:cNvPr id="210" name="Shape 210"/>
+        <p:cNvGrpSpPr/>
+        <p:nvPr/>
+      </p:nvGrpSpPr>
+      <p:grpSpPr>
+        <a:xfrm>
+          <a:off x="0" y="0"/>
+          <a:ext cx="0" cy="0"/>
+          <a:chOff x="0" y="0"/>
+          <a:chExt cx="0" cy="0"/>
+        </a:xfrm>
+      </p:grpSpPr>
+      <p:sp>
+        <p:nvSpPr>
+          <p:cNvPr id="211" name="Google Shape;211;p38"/>
+          <p:cNvSpPr txBox="1"/>
+          <p:nvPr>
+            <p:ph type="title"/>
+          </p:nvPr>
+        </p:nvSpPr>
+        <p:spPr>
+          <a:xfrm>
+            <a:off x="311700" y="445025"/>
+            <a:ext cx="8520600" cy="572700"/>
+          </a:xfrm>
+          <a:prstGeom prst="rect">
+            <a:avLst/>
+          </a:prstGeom>
+        </p:spPr>
+        <p:txBody>
+          <a:bodyPr anchorCtr="0" anchor="t" bIns="91425" lIns="91425" spcFirstLastPara="1" rIns="91425" wrap="square" tIns="91425">
+            <a:noAutofit/>
+          </a:bodyPr>
+          <a:lstStyle/>
+          <a:p>
+            <a:pPr indent="0" lvl="0" marL="0" rtl="0" algn="l">
+              <a:spcBef>
+                <a:spcPts val="0"/>
+              </a:spcBef>
+              <a:spcAft>
+                <a:spcPts val="0"/>
+              </a:spcAft>
+              <a:buNone/>
+            </a:pPr>
+            <a:r>
+              <a:rPr lang="en"/>
+              <a:t>Fuentes de Consulta</a:t>
+            </a:r>
+            <a:endParaRPr/>
+          </a:p>
+        </p:txBody>
+      </p:sp>
+      <p:sp>
+        <p:nvSpPr>
+          <p:cNvPr id="212" name="Google Shape;212;p38"/>
+          <p:cNvSpPr txBox="1"/>
+          <p:nvPr>
+            <p:ph idx="1" type="body"/>
+          </p:nvPr>
+        </p:nvSpPr>
+        <p:spPr>
+          <a:xfrm>
+            <a:off x="311700" y="1152475"/>
+            <a:ext cx="8520600" cy="3416400"/>
+          </a:xfrm>
+          <a:prstGeom prst="rect">
+            <a:avLst/>
+          </a:prstGeom>
+        </p:spPr>
+        <p:txBody>
+          <a:bodyPr anchorCtr="0" anchor="t" bIns="91425" lIns="91425" spcFirstLastPara="1" rIns="91425" wrap="square" tIns="91425">
+            <a:noAutofit/>
+          </a:bodyPr>
+          <a:lstStyle/>
+          <a:p>
+            <a:pPr indent="-317500" lvl="0" marL="457200" rtl="0" algn="just">
+              <a:spcBef>
+                <a:spcPts val="0"/>
+              </a:spcBef>
+              <a:spcAft>
+                <a:spcPts val="0"/>
+              </a:spcAft>
+              <a:buClr>
+                <a:srgbClr val="000000"/>
+              </a:buClr>
+              <a:buSzPts val="1400"/>
+              <a:buChar char="●"/>
+            </a:pPr>
+            <a:r>
+              <a:rPr lang="en" sz="1400">
                 <a:solidFill>
-                  <a:srgbClr val="1155CC"/>
+                  <a:srgbClr val="000000"/>
                 </a:solidFill>
-                <a:latin typeface="Arial"/>
-                <a:ea typeface="Arial"/>
-                <a:cs typeface="Arial"/>
-                <a:sym typeface="Arial"/>
+              </a:rPr>
+              <a:t>Locutus. Inteligencia artificial en un sistema operativo. Recuperado de </a:t>
+            </a:r>
+            <a:r>
+              <a:rPr lang="en" sz="1400">
+                <a:solidFill>
+                  <a:srgbClr val="000000"/>
+                </a:solidFill>
+                <a:uFill>
+                  <a:noFill/>
+                </a:uFill>
                 <a:hlinkClick r:id="rId3"/>
               </a:rPr>
               <a:t>https://it.toolbox.com/blogs/locutus/artificial-intelligence-in-an-operating-system-091118</a:t>
             </a:r>
-            <a:endParaRPr sz="1100">
-              <a:solidFill>
-                <a:srgbClr val="000000"/>
-              </a:solidFill>
-              <a:latin typeface="Arial"/>
-              <a:ea typeface="Arial"/>
-              <a:cs typeface="Arial"/>
-              <a:sym typeface="Arial"/>
-            </a:endParaRPr>
-          </a:p>
-          <a:p>
-            <a:pPr indent="0" lvl="0" marL="0" rtl="0" algn="l">
-              <a:spcBef>
-                <a:spcPts val="0"/>
-              </a:spcBef>
-              <a:spcAft>
-                <a:spcPts val="0"/>
-              </a:spcAft>
-              <a:buNone/>
-            </a:pPr>
-            <a:r>
-              <a:rPr lang="en" sz="1100" u="sng">
-                <a:solidFill>
-                  <a:srgbClr val="1155CC"/>
-                </a:solidFill>
-                <a:latin typeface="Arial"/>
-                <a:ea typeface="Arial"/>
-                <a:cs typeface="Arial"/>
-                <a:sym typeface="Arial"/>
-                <a:hlinkClick r:id="rId4"/>
-              </a:rPr>
-              <a:t>https://www.researchgate.net/publication/320173364_Artificial_Intelligence_Operating_System</a:t>
-            </a:r>
-            <a:endParaRPr sz="1100">
-              <a:solidFill>
-                <a:srgbClr val="000000"/>
-              </a:solidFill>
-              <a:latin typeface="Arial"/>
-              <a:ea typeface="Arial"/>
-              <a:cs typeface="Arial"/>
-              <a:sym typeface="Arial"/>
-            </a:endParaRPr>
-          </a:p>
-          <a:p>
-            <a:pPr indent="0" lvl="0" marL="0" rtl="0" algn="l">
-              <a:spcBef>
-                <a:spcPts val="0"/>
-              </a:spcBef>
-              <a:spcAft>
-                <a:spcPts val="0"/>
-              </a:spcAft>
-              <a:buNone/>
-            </a:pPr>
-            <a:r>
-              <a:rPr lang="en" sz="1100" u="sng">
-                <a:solidFill>
-                  <a:srgbClr val="1155CC"/>
-                </a:solidFill>
-                <a:latin typeface="Arial"/>
-                <a:ea typeface="Arial"/>
-                <a:cs typeface="Arial"/>
-                <a:sym typeface="Arial"/>
-                <a:hlinkClick r:id="rId5"/>
-              </a:rPr>
-              <a:t>https://www.ijltet.org/journal/151063991811.pdf</a:t>
-            </a:r>
-            <a:endParaRPr sz="1100">
-              <a:solidFill>
-                <a:srgbClr val="000000"/>
-              </a:solidFill>
-              <a:latin typeface="Arial"/>
-              <a:ea typeface="Arial"/>
-              <a:cs typeface="Arial"/>
-              <a:sym typeface="Arial"/>
-            </a:endParaRPr>
-          </a:p>
-          <a:p>
-            <a:pPr indent="0" lvl="0" marL="0" rtl="0" algn="l">
-              <a:spcBef>
-                <a:spcPts val="0"/>
-              </a:spcBef>
-              <a:spcAft>
-                <a:spcPts val="0"/>
-              </a:spcAft>
-              <a:buNone/>
-            </a:pPr>
-            <a:r>
-              <a:rPr lang="en" sz="1100" u="sng">
-                <a:solidFill>
-                  <a:srgbClr val="1155CC"/>
-                </a:solidFill>
-                <a:latin typeface="Arial"/>
-                <a:ea typeface="Arial"/>
-                <a:cs typeface="Arial"/>
-                <a:sym typeface="Arial"/>
-                <a:hlinkClick r:id="rId6"/>
-              </a:rPr>
-              <a:t>https://second-renaissance.fandom.com/wiki/Artificial-Intelligence_Operating_System</a:t>
-            </a:r>
-            <a:endParaRPr sz="1100">
-              <a:solidFill>
-                <a:srgbClr val="000000"/>
-              </a:solidFill>
-              <a:latin typeface="Arial"/>
-              <a:ea typeface="Arial"/>
-              <a:cs typeface="Arial"/>
-              <a:sym typeface="Arial"/>
-            </a:endParaRPr>
-          </a:p>
-          <a:p>
-            <a:pPr indent="0" lvl="0" marL="0" rtl="0" algn="l">
-              <a:spcBef>
-                <a:spcPts val="0"/>
-              </a:spcBef>
-              <a:spcAft>
-                <a:spcPts val="0"/>
-              </a:spcAft>
-              <a:buNone/>
-            </a:pPr>
-            <a:r>
-              <a:rPr lang="en" sz="1100" u="sng">
-                <a:solidFill>
-                  <a:srgbClr val="1155CC"/>
-                </a:solidFill>
-                <a:latin typeface="Arial"/>
-                <a:ea typeface="Arial"/>
-                <a:cs typeface="Arial"/>
-                <a:sym typeface="Arial"/>
-                <a:hlinkClick r:id="rId7"/>
-              </a:rPr>
-              <a:t>https://towardsdatascience.com/ai-and-the-operating-system-4282edd3a930</a:t>
-            </a:r>
-            <a:endParaRPr>
+            <a:endParaRPr sz="1400">
               <a:solidFill>
                 <a:srgbClr val="000000"/>
               </a:solidFill>
             </a:endParaRPr>
           </a:p>
           <a:p>
-            <a:pPr indent="0" lvl="0" marL="0" rtl="0" algn="l">
-              <a:spcBef>
-                <a:spcPts val="0"/>
-              </a:spcBef>
-              <a:spcAft>
-                <a:spcPts val="0"/>
-              </a:spcAft>
-              <a:buNone/>
+            <a:pPr indent="-317500" lvl="0" marL="457200" rtl="0" algn="just">
+              <a:spcBef>
+                <a:spcPts val="0"/>
+              </a:spcBef>
+              <a:spcAft>
+                <a:spcPts val="0"/>
+              </a:spcAft>
+              <a:buClr>
+                <a:srgbClr val="000000"/>
+              </a:buClr>
+              <a:buSzPts val="1400"/>
+              <a:buChar char="●"/>
             </a:pPr>
             <a:r>
-              <a:rPr lang="en" sz="1100" u="sng">
+              <a:rPr lang="en" sz="1400">
                 <a:solidFill>
-                  <a:schemeClr val="hlink"/>
+                  <a:srgbClr val="000000"/>
                 </a:solidFill>
-                <a:latin typeface="Arial"/>
-                <a:ea typeface="Arial"/>
-                <a:cs typeface="Arial"/>
-                <a:sym typeface="Arial"/>
-                <a:hlinkClick r:id="rId8"/>
               </a:rPr>
-              <a:t>https://www.indiegogo.com/projects/world-s-first-phone-with-human-like-intelligence--2#/</a:t>
-            </a:r>
-            <a:endParaRPr>
+              <a:t>Korneev, Sergei. Artificial Intelligence on Operating Systems. Recuperado de </a:t>
+            </a:r>
+            <a:r>
+              <a:rPr lang="en" sz="1400">
+                <a:solidFill>
+                  <a:srgbClr val="000000"/>
+                </a:solidFill>
+                <a:uFill>
+                  <a:noFill/>
+                </a:uFill>
+                <a:hlinkClick r:id="rId4"/>
+              </a:rPr>
+              <a:t>https://www.researchgate.net/publication/320173364_Artificial_Intelligence_Operating_System</a:t>
+            </a:r>
+            <a:endParaRPr sz="1400">
               <a:solidFill>
                 <a:srgbClr val="000000"/>
               </a:solidFill>
             </a:endParaRPr>
           </a:p>
           <a:p>
-            <a:pPr indent="0" lvl="0" marL="0" rtl="0" algn="l">
-              <a:spcBef>
-                <a:spcPts val="0"/>
-              </a:spcBef>
-              <a:spcAft>
-                <a:spcPts val="0"/>
-              </a:spcAft>
-              <a:buNone/>
+            <a:pPr indent="-317500" lvl="0" marL="457200" rtl="0" algn="just">
+              <a:spcBef>
+                <a:spcPts val="0"/>
+              </a:spcBef>
+              <a:spcAft>
+                <a:spcPts val="0"/>
+              </a:spcAft>
+              <a:buClr>
+                <a:srgbClr val="000000"/>
+              </a:buClr>
+              <a:buSzPts val="1400"/>
+              <a:buChar char="●"/>
             </a:pPr>
             <a:r>
-              <a:rPr lang="en">
+              <a:rPr lang="en" sz="1400">
+                <a:solidFill>
+                  <a:srgbClr val="000000"/>
+                </a:solidFill>
+              </a:rPr>
+              <a:t>Rilwan, Snehal &amp; Shetty, Annapoorna. </a:t>
+            </a:r>
+            <a:r>
+              <a:rPr lang="en" sz="1400">
+                <a:solidFill>
+                  <a:srgbClr val="000000"/>
+                </a:solidFill>
+              </a:rPr>
+              <a:t>A Study on Artiicial Intelligence on Operating Systems. Recuperado de </a:t>
+            </a:r>
+            <a:r>
+              <a:rPr lang="en" sz="1400">
+                <a:solidFill>
+                  <a:srgbClr val="000000"/>
+                </a:solidFill>
+                <a:uFill>
+                  <a:noFill/>
+                </a:uFill>
+                <a:hlinkClick r:id="rId5"/>
+              </a:rPr>
+              <a:t>https://www.ijltet.org/journal/151063991811.pdf</a:t>
+            </a:r>
+            <a:endParaRPr sz="1400">
+              <a:solidFill>
+                <a:srgbClr val="000000"/>
+              </a:solidFill>
+            </a:endParaRPr>
+          </a:p>
+          <a:p>
+            <a:pPr indent="-317500" lvl="0" marL="457200" rtl="0" algn="just">
+              <a:spcBef>
+                <a:spcPts val="0"/>
+              </a:spcBef>
+              <a:spcAft>
+                <a:spcPts val="0"/>
+              </a:spcAft>
+              <a:buClr>
+                <a:srgbClr val="000000"/>
+              </a:buClr>
+              <a:buSzPts val="1400"/>
+              <a:buChar char="●"/>
+            </a:pPr>
+            <a:r>
+              <a:rPr lang="en" sz="1400">
+                <a:solidFill>
+                  <a:srgbClr val="000000"/>
+                </a:solidFill>
+              </a:rPr>
+              <a:t>Morgante, Victor. AI y el Sistema Operativo. Recuperado de </a:t>
+            </a:r>
+            <a:r>
+              <a:rPr lang="en" sz="1400">
+                <a:solidFill>
+                  <a:srgbClr val="000000"/>
+                </a:solidFill>
+                <a:uFill>
+                  <a:noFill/>
+                </a:uFill>
+                <a:hlinkClick r:id="rId6"/>
+              </a:rPr>
+              <a:t>https://towardsdatascience.com/ai-and-the-operating-system-4282edd3a930</a:t>
+            </a:r>
+            <a:endParaRPr sz="1400">
+              <a:solidFill>
+                <a:srgbClr val="000000"/>
+              </a:solidFill>
+            </a:endParaRPr>
+          </a:p>
+          <a:p>
+            <a:pPr indent="-317500" lvl="0" marL="457200" rtl="0" algn="just">
+              <a:spcBef>
+                <a:spcPts val="0"/>
+              </a:spcBef>
+              <a:spcAft>
+                <a:spcPts val="0"/>
+              </a:spcAft>
+              <a:buSzPts val="1400"/>
+              <a:buChar char="●"/>
+            </a:pPr>
+            <a:r>
+              <a:rPr lang="en" sz="1400">
+                <a:solidFill>
+                  <a:srgbClr val="000000"/>
+                </a:solidFill>
+                <a:uFill>
+                  <a:noFill/>
+                </a:uFill>
+                <a:hlinkClick r:id="rId7"/>
+              </a:rPr>
+              <a:t>https://www.indiegogo.com/projects/world-s-first-phone-with-human-like-intelligence--2#/</a:t>
+            </a:r>
+            <a:endParaRPr sz="1400">
+              <a:solidFill>
+                <a:srgbClr val="000000"/>
+              </a:solidFill>
+            </a:endParaRPr>
+          </a:p>
+          <a:p>
+            <a:pPr indent="-317500" lvl="0" marL="457200" rtl="0" algn="just">
+              <a:spcBef>
+                <a:spcPts val="0"/>
+              </a:spcBef>
+              <a:spcAft>
+                <a:spcPts val="0"/>
+              </a:spcAft>
+              <a:buClr>
+                <a:srgbClr val="000000"/>
+              </a:buClr>
+              <a:buSzPts val="1400"/>
+              <a:buChar char="●"/>
+            </a:pPr>
+            <a:r>
+              <a:rPr lang="en" sz="1400">
                 <a:solidFill>
                   <a:srgbClr val="000000"/>
                 </a:solidFill>
               </a:rPr>
               <a:t>JatinBorana, “Applications of Artificial Intelligence &amp; Associated Technologies”, Proceeding of International Conference on Emerging Technologies in Engineering, Biomedical, Management and Science [ETEBMS-2016], 5-6 March 2016. </a:t>
             </a:r>
-            <a:endParaRPr>
+            <a:endParaRPr sz="1400">
               <a:solidFill>
                 <a:srgbClr val="000000"/>
               </a:solidFill>
@@ -11360,6 +12339,33 @@
           </a:p>
         </p:txBody>
       </p:sp>
+      <p:pic>
+        <p:nvPicPr>
+          <p:cNvPr id="108" name="Google Shape;108;p21"/>
+          <p:cNvPicPr preferRelativeResize="0"/>
+          <p:nvPr/>
+        </p:nvPicPr>
+        <p:blipFill rotWithShape="1">
+          <a:blip r:embed="rId3">
+            <a:alphaModFix/>
+          </a:blip>
+          <a:srcRect b="7518" l="0" r="0" t="0"/>
+          <a:stretch/>
+        </p:blipFill>
+        <p:spPr>
+          <a:xfrm>
+            <a:off x="3065900" y="2625450"/>
+            <a:ext cx="3012200" cy="2191100"/>
+          </a:xfrm>
+          <a:prstGeom prst="rect">
+            <a:avLst/>
+          </a:prstGeom>
+          <a:noFill/>
+          <a:ln>
+            <a:noFill/>
+          </a:ln>
+        </p:spPr>
+      </p:pic>
     </p:spTree>
   </p:cSld>
   <p:clrMapOvr>

</xml_diff>